<commit_message>
Actualización Scripts Lección 4 y 5
Actualización de Scripts 4 y 5.
</commit_message>
<xml_diff>
--- a/18-data-visualization/Contenido Semana 2/4.2. Presentación - Visualizaciones Tradicionales.pptx
+++ b/18-data-visualization/Contenido Semana 2/4.2. Presentación - Visualizaciones Tradicionales.pptx
@@ -5,41 +5,39 @@
     <p:sldMasterId id="2147483670" r:id="rId1"/>
   </p:sldMasterIdLst>
   <p:notesMasterIdLst>
-    <p:notesMasterId r:id="rId10"/>
+    <p:notesMasterId r:id="rId8"/>
   </p:notesMasterIdLst>
   <p:sldIdLst>
     <p:sldId id="282" r:id="rId2"/>
     <p:sldId id="283" r:id="rId3"/>
     <p:sldId id="290" r:id="rId4"/>
     <p:sldId id="291" r:id="rId5"/>
-    <p:sldId id="286" r:id="rId6"/>
+    <p:sldId id="293" r:id="rId6"/>
     <p:sldId id="287" r:id="rId7"/>
-    <p:sldId id="289" r:id="rId8"/>
-    <p:sldId id="284" r:id="rId9"/>
   </p:sldIdLst>
   <p:sldSz cx="9144000" cy="6858000" type="screen4x3"/>
   <p:notesSz cx="6858000" cy="9144000"/>
   <p:embeddedFontLst>
     <p:embeddedFont>
-      <p:font typeface="Calibri" panose="020F0502020204030204" pitchFamily="34" charset="0"/>
-      <p:regular r:id="rId11"/>
-      <p:bold r:id="rId12"/>
-      <p:italic r:id="rId13"/>
-      <p:boldItalic r:id="rId14"/>
-    </p:embeddedFont>
-    <p:embeddedFont>
       <p:font typeface="Raleway" panose="020B0604020202020204" charset="0"/>
-      <p:regular r:id="rId15"/>
-      <p:bold r:id="rId16"/>
-      <p:italic r:id="rId17"/>
-      <p:boldItalic r:id="rId18"/>
+      <p:regular r:id="rId9"/>
+      <p:bold r:id="rId10"/>
+      <p:italic r:id="rId11"/>
+      <p:boldItalic r:id="rId12"/>
     </p:embeddedFont>
     <p:embeddedFont>
       <p:font typeface="Montserrat" panose="020B0604020202020204" charset="0"/>
-      <p:regular r:id="rId19"/>
-      <p:bold r:id="rId20"/>
-      <p:italic r:id="rId21"/>
-      <p:boldItalic r:id="rId22"/>
+      <p:regular r:id="rId13"/>
+      <p:bold r:id="rId14"/>
+      <p:italic r:id="rId15"/>
+      <p:boldItalic r:id="rId16"/>
+    </p:embeddedFont>
+    <p:embeddedFont>
+      <p:font typeface="Calibri" panose="020F0502020204030204" pitchFamily="34" charset="0"/>
+      <p:regular r:id="rId17"/>
+      <p:bold r:id="rId18"/>
+      <p:italic r:id="rId19"/>
+      <p:boldItalic r:id="rId20"/>
     </p:embeddedFont>
   </p:embeddedFontLst>
   <p:defaultTextStyle>
@@ -1642,7 +1640,7 @@
     </p:spTree>
     <p:extLst>
       <p:ext uri="{BB962C8B-B14F-4D97-AF65-F5344CB8AC3E}">
-        <p14:creationId xmlns:p14="http://schemas.microsoft.com/office/powerpoint/2010/main" val="3990415597"/>
+        <p14:creationId xmlns:p14="http://schemas.microsoft.com/office/powerpoint/2010/main" val="714357775"/>
       </p:ext>
     </p:extLst>
   </p:cSld>
@@ -1749,218 +1747,6 @@
     <p:extLst>
       <p:ext uri="{BB962C8B-B14F-4D97-AF65-F5344CB8AC3E}">
         <p14:creationId xmlns:p14="http://schemas.microsoft.com/office/powerpoint/2010/main" val="1921523323"/>
-      </p:ext>
-    </p:extLst>
-  </p:cSld>
-  <p:clrMapOvr>
-    <a:masterClrMapping/>
-  </p:clrMapOvr>
-</p:notes>
-</file>
-
-<file path=ppt/notesSlides/notesSlide7.xml><?xml version="1.0" encoding="utf-8"?>
-<p:notes xmlns:a="http://schemas.openxmlformats.org/drawingml/2006/main" xmlns:r="http://schemas.openxmlformats.org/officeDocument/2006/relationships" xmlns:p="http://schemas.openxmlformats.org/presentationml/2006/main" showMasterSp="0" showMasterPhAnim="0">
-  <p:cSld>
-    <p:spTree>
-      <p:nvGrpSpPr>
-        <p:cNvPr id="1" name="Shape 389"/>
-        <p:cNvGrpSpPr/>
-        <p:nvPr/>
-      </p:nvGrpSpPr>
-      <p:grpSpPr>
-        <a:xfrm>
-          <a:off x="0" y="0"/>
-          <a:ext cx="0" cy="0"/>
-          <a:chOff x="0" y="0"/>
-          <a:chExt cx="0" cy="0"/>
-        </a:xfrm>
-      </p:grpSpPr>
-      <p:sp>
-        <p:nvSpPr>
-          <p:cNvPr id="390" name="Shape 390"/>
-          <p:cNvSpPr txBox="1">
-            <a:spLocks noGrp="1"/>
-          </p:cNvSpPr>
-          <p:nvPr>
-            <p:ph type="body" idx="1"/>
-          </p:nvPr>
-        </p:nvSpPr>
-        <p:spPr>
-          <a:xfrm>
-            <a:off x="685800" y="4343400"/>
-            <a:ext cx="5486400" cy="4114800"/>
-          </a:xfrm>
-          <a:prstGeom prst="rect">
-            <a:avLst/>
-          </a:prstGeom>
-        </p:spPr>
-        <p:txBody>
-          <a:bodyPr lIns="91425" tIns="91425" rIns="91425" bIns="91425" anchor="t" anchorCtr="0">
-            <a:noAutofit/>
-          </a:bodyPr>
-          <a:lstStyle/>
-          <a:p>
-            <a:pPr lvl="0">
-              <a:spcBef>
-                <a:spcPts val="0"/>
-              </a:spcBef>
-              <a:buNone/>
-            </a:pPr>
-            <a:endParaRPr/>
-          </a:p>
-        </p:txBody>
-      </p:sp>
-      <p:sp>
-        <p:nvSpPr>
-          <p:cNvPr id="391" name="Shape 391"/>
-          <p:cNvSpPr>
-            <a:spLocks noGrp="1" noRot="1" noChangeAspect="1"/>
-          </p:cNvSpPr>
-          <p:nvPr>
-            <p:ph type="sldImg" idx="2"/>
-          </p:nvPr>
-        </p:nvSpPr>
-        <p:spPr>
-          <a:xfrm>
-            <a:off x="1143000" y="685800"/>
-            <a:ext cx="4572000" cy="3429000"/>
-          </a:xfrm>
-          <a:custGeom>
-            <a:avLst/>
-            <a:gdLst/>
-            <a:ahLst/>
-            <a:cxnLst/>
-            <a:rect l="0" t="0" r="0" b="0"/>
-            <a:pathLst>
-              <a:path w="120000" h="120000" extrusionOk="0">
-                <a:moveTo>
-                  <a:pt x="0" y="0"/>
-                </a:moveTo>
-                <a:lnTo>
-                  <a:pt x="120000" y="0"/>
-                </a:lnTo>
-                <a:lnTo>
-                  <a:pt x="120000" y="120000"/>
-                </a:lnTo>
-                <a:lnTo>
-                  <a:pt x="0" y="120000"/>
-                </a:lnTo>
-                <a:close/>
-              </a:path>
-            </a:pathLst>
-          </a:custGeom>
-        </p:spPr>
-      </p:sp>
-    </p:spTree>
-    <p:extLst>
-      <p:ext uri="{BB962C8B-B14F-4D97-AF65-F5344CB8AC3E}">
-        <p14:creationId xmlns:p14="http://schemas.microsoft.com/office/powerpoint/2010/main" val="4075176867"/>
-      </p:ext>
-    </p:extLst>
-  </p:cSld>
-  <p:clrMapOvr>
-    <a:masterClrMapping/>
-  </p:clrMapOvr>
-</p:notes>
-</file>
-
-<file path=ppt/notesSlides/notesSlide8.xml><?xml version="1.0" encoding="utf-8"?>
-<p:notes xmlns:a="http://schemas.openxmlformats.org/drawingml/2006/main" xmlns:r="http://schemas.openxmlformats.org/officeDocument/2006/relationships" xmlns:p="http://schemas.openxmlformats.org/presentationml/2006/main" showMasterSp="0" showMasterPhAnim="0">
-  <p:cSld>
-    <p:spTree>
-      <p:nvGrpSpPr>
-        <p:cNvPr id="1" name="Shape 389"/>
-        <p:cNvGrpSpPr/>
-        <p:nvPr/>
-      </p:nvGrpSpPr>
-      <p:grpSpPr>
-        <a:xfrm>
-          <a:off x="0" y="0"/>
-          <a:ext cx="0" cy="0"/>
-          <a:chOff x="0" y="0"/>
-          <a:chExt cx="0" cy="0"/>
-        </a:xfrm>
-      </p:grpSpPr>
-      <p:sp>
-        <p:nvSpPr>
-          <p:cNvPr id="390" name="Shape 390"/>
-          <p:cNvSpPr txBox="1">
-            <a:spLocks noGrp="1"/>
-          </p:cNvSpPr>
-          <p:nvPr>
-            <p:ph type="body" idx="1"/>
-          </p:nvPr>
-        </p:nvSpPr>
-        <p:spPr>
-          <a:xfrm>
-            <a:off x="685800" y="4343400"/>
-            <a:ext cx="5486400" cy="4114800"/>
-          </a:xfrm>
-          <a:prstGeom prst="rect">
-            <a:avLst/>
-          </a:prstGeom>
-        </p:spPr>
-        <p:txBody>
-          <a:bodyPr lIns="91425" tIns="91425" rIns="91425" bIns="91425" anchor="t" anchorCtr="0">
-            <a:noAutofit/>
-          </a:bodyPr>
-          <a:lstStyle/>
-          <a:p>
-            <a:pPr lvl="0">
-              <a:spcBef>
-                <a:spcPts val="0"/>
-              </a:spcBef>
-              <a:buNone/>
-            </a:pPr>
-            <a:endParaRPr/>
-          </a:p>
-        </p:txBody>
-      </p:sp>
-      <p:sp>
-        <p:nvSpPr>
-          <p:cNvPr id="391" name="Shape 391"/>
-          <p:cNvSpPr>
-            <a:spLocks noGrp="1" noRot="1" noChangeAspect="1"/>
-          </p:cNvSpPr>
-          <p:nvPr>
-            <p:ph type="sldImg" idx="2"/>
-          </p:nvPr>
-        </p:nvSpPr>
-        <p:spPr>
-          <a:xfrm>
-            <a:off x="1143000" y="685800"/>
-            <a:ext cx="4572000" cy="3429000"/>
-          </a:xfrm>
-          <a:custGeom>
-            <a:avLst/>
-            <a:gdLst/>
-            <a:ahLst/>
-            <a:cxnLst/>
-            <a:rect l="0" t="0" r="0" b="0"/>
-            <a:pathLst>
-              <a:path w="120000" h="120000" extrusionOk="0">
-                <a:moveTo>
-                  <a:pt x="0" y="0"/>
-                </a:moveTo>
-                <a:lnTo>
-                  <a:pt x="120000" y="0"/>
-                </a:lnTo>
-                <a:lnTo>
-                  <a:pt x="120000" y="120000"/>
-                </a:lnTo>
-                <a:lnTo>
-                  <a:pt x="0" y="120000"/>
-                </a:lnTo>
-                <a:close/>
-              </a:path>
-            </a:pathLst>
-          </a:custGeom>
-        </p:spPr>
-      </p:sp>
-    </p:spTree>
-    <p:extLst>
-      <p:ext uri="{BB962C8B-B14F-4D97-AF65-F5344CB8AC3E}">
-        <p14:creationId xmlns:p14="http://schemas.microsoft.com/office/powerpoint/2010/main" val="2395324277"/>
       </p:ext>
     </p:extLst>
   </p:cSld>
@@ -11442,6 +11228,91 @@
           </a:p>
         </p:txBody>
       </p:sp>
+      <p:sp>
+        <p:nvSpPr>
+          <p:cNvPr id="19" name="TextBox 18">
+            <a:extLst>
+              <a:ext uri="{FF2B5EF4-FFF2-40B4-BE49-F238E27FC236}">
+                <a16:creationId xmlns:a16="http://schemas.microsoft.com/office/drawing/2014/main" id="{24C60906-D2F9-4930-AFC5-D644E5FE5DF3}"/>
+              </a:ext>
+            </a:extLst>
+          </p:cNvPr>
+          <p:cNvSpPr txBox="1"/>
+          <p:nvPr/>
+        </p:nvSpPr>
+        <p:spPr>
+          <a:xfrm rot="16200000">
+            <a:off x="-589997" y="2484931"/>
+            <a:ext cx="1989857" cy="523220"/>
+          </a:xfrm>
+          <a:prstGeom prst="rect">
+            <a:avLst/>
+          </a:prstGeom>
+          <a:noFill/>
+        </p:spPr>
+        <p:txBody>
+          <a:bodyPr wrap="square" rtlCol="0">
+            <a:spAutoFit/>
+          </a:bodyPr>
+          <a:lstStyle/>
+          <a:p>
+            <a:pPr algn="ctr"/>
+            <a:r>
+              <a:rPr lang="es-VE" b="1" dirty="0">
+                <a:latin typeface="Raleway" panose="020B0604020202020204" charset="0"/>
+              </a:rPr>
+              <a:t>Eje Y o coordenadas: Valores</a:t>
+            </a:r>
+            <a:endParaRPr lang="en-US" b="1" dirty="0">
+              <a:latin typeface="Raleway" panose="020B0604020202020204" charset="0"/>
+            </a:endParaRPr>
+          </a:p>
+        </p:txBody>
+      </p:sp>
+      <p:cxnSp>
+        <p:nvCxnSpPr>
+          <p:cNvPr id="21" name="Straight Arrow Connector 20">
+            <a:extLst>
+              <a:ext uri="{FF2B5EF4-FFF2-40B4-BE49-F238E27FC236}">
+                <a16:creationId xmlns:a16="http://schemas.microsoft.com/office/drawing/2014/main" id="{DB98A505-CA5F-4F9F-AFCB-D4C31CFE880F}"/>
+              </a:ext>
+            </a:extLst>
+          </p:cNvPr>
+          <p:cNvCxnSpPr>
+            <a:cxnSpLocks/>
+          </p:cNvCxnSpPr>
+          <p:nvPr/>
+        </p:nvCxnSpPr>
+        <p:spPr>
+          <a:xfrm flipV="1">
+            <a:off x="778725" y="1674214"/>
+            <a:ext cx="0" cy="2639272"/>
+          </a:xfrm>
+          <a:prstGeom prst="straightConnector1">
+            <a:avLst/>
+          </a:prstGeom>
+          <a:ln>
+            <a:solidFill>
+              <a:srgbClr val="F7B617"/>
+            </a:solidFill>
+            <a:tailEnd type="triangle"/>
+          </a:ln>
+        </p:spPr>
+        <p:style>
+          <a:lnRef idx="1">
+            <a:schemeClr val="accent1"/>
+          </a:lnRef>
+          <a:fillRef idx="0">
+            <a:schemeClr val="accent1"/>
+          </a:fillRef>
+          <a:effectRef idx="0">
+            <a:schemeClr val="accent1"/>
+          </a:effectRef>
+          <a:fontRef idx="minor">
+            <a:schemeClr val="tx1"/>
+          </a:fontRef>
+        </p:style>
+      </p:cxnSp>
     </p:spTree>
     <p:extLst>
       <p:ext uri="{BB962C8B-B14F-4D97-AF65-F5344CB8AC3E}">
@@ -12192,7 +12063,7 @@
         <p:spPr>
           <a:xfrm>
             <a:off x="3812020" y="1592568"/>
-            <a:ext cx="5174137" cy="2677656"/>
+            <a:ext cx="5174137" cy="3323987"/>
           </a:xfrm>
           <a:prstGeom prst="rect">
             <a:avLst/>
@@ -12221,13 +12092,17 @@
               <a:buChar char="•"/>
             </a:pPr>
             <a:r>
-              <a:rPr lang="es-VE" dirty="0">
+              <a:rPr lang="es-ES" dirty="0">
                 <a:latin typeface="Raleway" panose="020B0604020202020204" charset="0"/>
               </a:rPr>
-              <a:t>Para mostrar de manera simple un conjunto de valores en 1 o 2 dimensiones. </a:t>
+              <a:t>Son ideales para entender proporciones completas en vez de radios como los de pie</a:t>
             </a:r>
           </a:p>
           <a:p>
+            <a:pPr marL="285750" indent="-285750">
+              <a:buFont typeface="Arial" panose="020B0604020202020204" pitchFamily="34" charset="0"/>
+              <a:buChar char="•"/>
+            </a:pPr>
             <a:endParaRPr lang="es-VE" dirty="0">
               <a:latin typeface="Raleway" panose="020B0604020202020204" charset="0"/>
             </a:endParaRPr>
@@ -12261,10 +12136,10 @@
               <a:buChar char="•"/>
             </a:pPr>
             <a:r>
-              <a:rPr lang="es-VE" dirty="0">
+              <a:rPr lang="es-ES" dirty="0">
                 <a:latin typeface="Raleway" panose="020B0604020202020204" charset="0"/>
               </a:rPr>
-              <a:t>Si se usa barras apiladas, usar una escala de colores por categorías. </a:t>
+              <a:t>Trata de las categorías sean fácilmente identificables.</a:t>
             </a:r>
           </a:p>
           <a:p>
@@ -12273,10 +12148,10 @@
               <a:buChar char="•"/>
             </a:pPr>
             <a:r>
-              <a:rPr lang="es-VE" dirty="0">
+              <a:rPr lang="es-ES" dirty="0">
                 <a:latin typeface="Raleway" panose="020B0604020202020204" charset="0"/>
               </a:rPr>
-              <a:t>Si se quiere usar comparación, usar barras lado a lado. </a:t>
+              <a:t>Si en tu historia quieres destacar que una es mucho más grande que otras, puede usarse aunque las otras no se identifiquen claramente. </a:t>
             </a:r>
           </a:p>
           <a:p>
@@ -12285,17 +12160,13 @@
               <a:buChar char="•"/>
             </a:pPr>
             <a:r>
-              <a:rPr lang="es-VE" dirty="0">
+              <a:rPr lang="es-ES" dirty="0">
                 <a:latin typeface="Raleway" panose="020B0604020202020204" charset="0"/>
               </a:rPr>
-              <a:t>Vertical es preferible a horizontal. </a:t>
+              <a:t>Escoge el color en una escala categórica, al menos que lo vayas a usar para mostrar una segunda dimensión que requiera una escala secuencial.</a:t>
             </a:r>
           </a:p>
           <a:p>
-            <a:pPr marL="285750" indent="-285750">
-              <a:buFont typeface="Arial" panose="020B0604020202020204" pitchFamily="34" charset="0"/>
-              <a:buChar char="•"/>
-            </a:pPr>
             <a:endParaRPr lang="es-VE" dirty="0">
               <a:latin typeface="Raleway" panose="020B0604020202020204" charset="0"/>
             </a:endParaRPr>
@@ -12316,46 +12187,6 @@
               </a:solidFill>
               <a:latin typeface="Raleway" panose="020B0604020202020204" charset="0"/>
             </a:endParaRPr>
-          </a:p>
-        </p:txBody>
-      </p:sp>
-      <p:sp>
-        <p:nvSpPr>
-          <p:cNvPr id="11" name="TextBox 10">
-            <a:extLst>
-              <a:ext uri="{FF2B5EF4-FFF2-40B4-BE49-F238E27FC236}">
-                <a16:creationId xmlns:a16="http://schemas.microsoft.com/office/drawing/2014/main" id="{5B58EB4E-8567-407E-8435-EFA9755A70AE}"/>
-              </a:ext>
-            </a:extLst>
-          </p:cNvPr>
-          <p:cNvSpPr txBox="1"/>
-          <p:nvPr/>
-        </p:nvSpPr>
-        <p:spPr>
-          <a:xfrm>
-            <a:off x="158389" y="5273988"/>
-            <a:ext cx="3261841" cy="307777"/>
-          </a:xfrm>
-          <a:prstGeom prst="rect">
-            <a:avLst/>
-          </a:prstGeom>
-          <a:noFill/>
-        </p:spPr>
-        <p:txBody>
-          <a:bodyPr wrap="square" rtlCol="0">
-            <a:spAutoFit/>
-          </a:bodyPr>
-          <a:lstStyle/>
-          <a:p>
-            <a:r>
-              <a:rPr lang="es-VE" b="1" dirty="0">
-                <a:solidFill>
-                  <a:srgbClr val="F7B617"/>
-                </a:solidFill>
-                <a:latin typeface="Raleway" panose="020B0604020202020204" charset="0"/>
-              </a:rPr>
-              <a:t>Variaciones: </a:t>
-            </a:r>
           </a:p>
         </p:txBody>
       </p:sp>
@@ -12373,8 +12204,8 @@
         </p:nvSpPr>
         <p:spPr>
           <a:xfrm>
-            <a:off x="1117077" y="4254555"/>
-            <a:ext cx="1845632" cy="307777"/>
+            <a:off x="603315" y="4504365"/>
+            <a:ext cx="2477229" cy="307777"/>
           </a:xfrm>
           <a:prstGeom prst="rect">
             <a:avLst/>
@@ -12392,7 +12223,7 @@
               <a:rPr lang="es-VE" b="1" dirty="0">
                 <a:latin typeface="Raleway" panose="020B0604020202020204" charset="0"/>
               </a:rPr>
-              <a:t>Dimensión 1</a:t>
+              <a:t>Tamaño de la Burbuja</a:t>
             </a:r>
             <a:endParaRPr lang="en-US" b="1" dirty="0">
               <a:latin typeface="Raleway" panose="020B0604020202020204" charset="0"/>
@@ -12462,7 +12293,7 @@
         </p:blipFill>
         <p:spPr>
           <a:xfrm>
-            <a:off x="4176693" y="4619656"/>
+            <a:off x="4332235" y="4874316"/>
             <a:ext cx="3622921" cy="1924217"/>
           </a:xfrm>
           <a:prstGeom prst="rect">
@@ -12472,10 +12303,10 @@
       </p:pic>
       <p:pic>
         <p:nvPicPr>
-          <p:cNvPr id="21" name="Picture 20" descr="A close up of a map&#10;&#10;Description generated with high confidence">
+          <p:cNvPr id="13" name="Picture 12" descr="A close up of a map&#10;&#10;Description generated with high confidence">
             <a:extLst>
               <a:ext uri="{FF2B5EF4-FFF2-40B4-BE49-F238E27FC236}">
-                <a16:creationId xmlns:a16="http://schemas.microsoft.com/office/drawing/2014/main" id="{B1972ED4-D45E-4D46-9AA4-F6538B5F0BDF}"/>
+                <a16:creationId xmlns:a16="http://schemas.microsoft.com/office/drawing/2014/main" id="{B1575CCA-AC44-4D55-A051-A292560A86C8}"/>
               </a:ext>
             </a:extLst>
           </p:cNvPr>
@@ -12486,107 +12317,64 @@
         </p:nvPicPr>
         <p:blipFill rotWithShape="1">
           <a:blip r:embed="rId5"/>
-          <a:srcRect l="3725" t="24426" r="64536" b="60655"/>
+          <a:srcRect l="1999" t="47803" r="64557" b="36083"/>
           <a:stretch/>
         </p:blipFill>
         <p:spPr>
           <a:xfrm>
-            <a:off x="1078250" y="2237052"/>
-            <a:ext cx="1638729" cy="1504417"/>
+            <a:off x="870071" y="2236470"/>
+            <a:ext cx="2163662" cy="2036182"/>
           </a:xfrm>
           <a:prstGeom prst="rect">
             <a:avLst/>
           </a:prstGeom>
         </p:spPr>
       </p:pic>
-      <p:sp>
-        <p:nvSpPr>
-          <p:cNvPr id="30" name="Arrow: Curved Up 29">
+      <p:cxnSp>
+        <p:nvCxnSpPr>
+          <p:cNvPr id="4" name="Straight Arrow Connector 3">
             <a:extLst>
               <a:ext uri="{FF2B5EF4-FFF2-40B4-BE49-F238E27FC236}">
-                <a16:creationId xmlns:a16="http://schemas.microsoft.com/office/drawing/2014/main" id="{36D9C970-4ECB-4A03-AD3C-175AABA0F952}"/>
+                <a16:creationId xmlns:a16="http://schemas.microsoft.com/office/drawing/2014/main" id="{5E6BB4EB-548F-4973-A477-3E3022402241}"/>
               </a:ext>
             </a:extLst>
           </p:cNvPr>
-          <p:cNvSpPr/>
+          <p:cNvCxnSpPr>
+            <a:cxnSpLocks/>
+          </p:cNvCxnSpPr>
           <p:nvPr/>
-        </p:nvSpPr>
+        </p:nvCxnSpPr>
         <p:spPr>
           <a:xfrm>
-            <a:off x="848803" y="3730324"/>
-            <a:ext cx="2295707" cy="383835"/>
-          </a:xfrm>
-          <a:prstGeom prst="curvedUpArrow">
+            <a:off x="1800520" y="4147794"/>
+            <a:ext cx="676480" cy="0"/>
+          </a:xfrm>
+          <a:prstGeom prst="straightConnector1">
             <a:avLst/>
           </a:prstGeom>
-          <a:solidFill>
-            <a:srgbClr val="F7B617"/>
-          </a:solidFill>
           <a:ln>
             <a:solidFill>
               <a:srgbClr val="F7B617"/>
             </a:solidFill>
+            <a:headEnd type="triangle"/>
+            <a:tailEnd type="triangle"/>
           </a:ln>
         </p:spPr>
         <p:style>
-          <a:lnRef idx="2">
-            <a:schemeClr val="accent1">
-              <a:shade val="50000"/>
-            </a:schemeClr>
+          <a:lnRef idx="1">
+            <a:schemeClr val="accent1"/>
           </a:lnRef>
-          <a:fillRef idx="1">
+          <a:fillRef idx="0">
             <a:schemeClr val="accent1"/>
           </a:fillRef>
           <a:effectRef idx="0">
             <a:schemeClr val="accent1"/>
           </a:effectRef>
           <a:fontRef idx="minor">
-            <a:schemeClr val="lt1"/>
+            <a:schemeClr val="tx1"/>
           </a:fontRef>
         </p:style>
-        <p:txBody>
-          <a:bodyPr rtlCol="0" anchor="ctr"/>
-          <a:lstStyle/>
-          <a:p>
-            <a:pPr algn="ctr"/>
-            <a:endParaRPr lang="en-US">
-              <a:solidFill>
-                <a:schemeClr val="tx1"/>
-              </a:solidFill>
-            </a:endParaRPr>
-          </a:p>
-        </p:txBody>
-      </p:sp>
-      <p:pic>
-        <p:nvPicPr>
-          <p:cNvPr id="33" name="Picture 32">
-            <a:extLst>
-              <a:ext uri="{FF2B5EF4-FFF2-40B4-BE49-F238E27FC236}">
-                <a16:creationId xmlns:a16="http://schemas.microsoft.com/office/drawing/2014/main" id="{41D1AEA7-1D2B-450D-95DE-4C2A5FB0AAC5}"/>
-              </a:ext>
-            </a:extLst>
-          </p:cNvPr>
-          <p:cNvPicPr>
-            <a:picLocks noChangeAspect="1"/>
-          </p:cNvPicPr>
-          <p:nvPr/>
-        </p:nvPicPr>
-        <p:blipFill>
-          <a:blip r:embed="rId6"/>
-          <a:stretch>
-            <a:fillRect/>
-          </a:stretch>
-        </p:blipFill>
-        <p:spPr>
-          <a:xfrm>
-            <a:off x="958461" y="5792518"/>
-            <a:ext cx="586791" cy="731583"/>
-          </a:xfrm>
-          <a:prstGeom prst="rect">
-            <a:avLst/>
-          </a:prstGeom>
-        </p:spPr>
-      </p:pic>
+      </p:cxnSp>
     </p:spTree>
     <p:extLst>
       <p:ext uri="{BB962C8B-B14F-4D97-AF65-F5344CB8AC3E}">
@@ -12617,6 +12405,36 @@
           <a:chExt cx="0" cy="0"/>
         </a:xfrm>
       </p:grpSpPr>
+      <p:pic>
+        <p:nvPicPr>
+          <p:cNvPr id="8" name="Picture 7" descr="A close up of a screen&#10;&#10;Description generated with high confidence">
+            <a:extLst>
+              <a:ext uri="{FF2B5EF4-FFF2-40B4-BE49-F238E27FC236}">
+                <a16:creationId xmlns:a16="http://schemas.microsoft.com/office/drawing/2014/main" id="{B08DF931-8650-46B4-918D-DDC8503AC790}"/>
+              </a:ext>
+            </a:extLst>
+          </p:cNvPr>
+          <p:cNvPicPr>
+            <a:picLocks noChangeAspect="1"/>
+          </p:cNvPicPr>
+          <p:nvPr/>
+        </p:nvPicPr>
+        <p:blipFill>
+          <a:blip r:embed="rId3"/>
+          <a:stretch>
+            <a:fillRect/>
+          </a:stretch>
+        </p:blipFill>
+        <p:spPr>
+          <a:xfrm>
+            <a:off x="739359" y="2131628"/>
+            <a:ext cx="2205140" cy="2020709"/>
+          </a:xfrm>
+          <a:prstGeom prst="rect">
+            <a:avLst/>
+          </a:prstGeom>
+        </p:spPr>
+      </p:pic>
       <p:sp>
         <p:nvSpPr>
           <p:cNvPr id="394" name="Shape 394"/>
@@ -12679,7 +12497,7 @@
           <p:nvPr/>
         </p:nvPicPr>
         <p:blipFill rotWithShape="1">
-          <a:blip r:embed="rId3">
+          <a:blip r:embed="rId4">
             <a:alphaModFix/>
           </a:blip>
           <a:srcRect/>
@@ -12741,7 +12559,7 @@
                 <a:cs typeface="Raleway"/>
                 <a:sym typeface="Raleway"/>
               </a:rPr>
-              <a:t>Gráfico de Torta o Pie</a:t>
+              <a:t>Gráfico de Dispersión</a:t>
             </a:r>
             <a:endParaRPr lang="es-GT" sz="3600" b="0" i="0" u="none" strike="noStrike" cap="none" dirty="0">
               <a:solidFill>
@@ -12769,8 +12587,8 @@
         </p:nvSpPr>
         <p:spPr>
           <a:xfrm>
-            <a:off x="3855563" y="1842940"/>
-            <a:ext cx="4515439" cy="2893100"/>
+            <a:off x="3812020" y="1592568"/>
+            <a:ext cx="5174137" cy="2677656"/>
           </a:xfrm>
           <a:prstGeom prst="rect">
             <a:avLst/>
@@ -12799,35 +12617,11 @@
               <a:buChar char="•"/>
             </a:pPr>
             <a:r>
-              <a:rPr lang="es-VE" dirty="0">
+              <a:rPr lang="es-ES" dirty="0">
                 <a:latin typeface="Raleway" panose="020B0604020202020204" charset="0"/>
               </a:rPr>
-              <a:t>Para mostrar la proporción de una dimensión respecto a toda la serie de datos. </a:t>
+              <a:t>Son muy útiles para entender relaciones entre 2 variables y poder al mismo tiempo ver otras dimensiones de ambas variables. </a:t>
             </a:r>
-          </a:p>
-          <a:p>
-            <a:endParaRPr lang="es-VE" dirty="0">
-              <a:latin typeface="Raleway" panose="020B0604020202020204" charset="0"/>
-            </a:endParaRPr>
-          </a:p>
-          <a:p>
-            <a:r>
-              <a:rPr lang="es-VE" dirty="0">
-                <a:latin typeface="Raleway" panose="020B0604020202020204" charset="0"/>
-              </a:rPr>
-              <a:t>Elementos:</a:t>
-            </a:r>
-          </a:p>
-          <a:p>
-            <a:pPr marL="285750" indent="-285750">
-              <a:buFont typeface="Arial" panose="020B0604020202020204" pitchFamily="34" charset="0"/>
-              <a:buChar char="•"/>
-            </a:pPr>
-            <a:endParaRPr lang="es-VE" dirty="0">
-              <a:latin typeface="Raleway" panose="020B0604020202020204" charset="0"/>
-            </a:endParaRPr>
-          </a:p>
-          <a:p>
             <a:endParaRPr lang="es-VE" dirty="0">
               <a:latin typeface="Raleway" panose="020B0604020202020204" charset="0"/>
             </a:endParaRPr>
@@ -12854,32 +12648,172 @@
               <a:buChar char="•"/>
             </a:pPr>
             <a:r>
-              <a:rPr lang="es-VE" dirty="0">
+              <a:rPr lang="es-ES" dirty="0">
                 <a:latin typeface="Raleway" panose="020B0604020202020204" charset="0"/>
               </a:rPr>
-              <a:t>No usar más de 7 categorías, en caso de haber más agrupar las pequeñas en una categoría: Otros. </a:t>
+              <a:t>Usa con cuidado toda la flexibilidad que te da está visualización, añadiendo variables que enriquezcan tu historia, pero siempre cuidando  que se entienda fácil cuando combines todas las dimensiones juntas.</a:t>
             </a:r>
-          </a:p>
-          <a:p>
-            <a:pPr marL="285750" indent="-285750">
-              <a:buFont typeface="Arial" panose="020B0604020202020204" pitchFamily="34" charset="0"/>
-              <a:buChar char="•"/>
-            </a:pPr>
+            <a:endParaRPr lang="es-VE" dirty="0">
+              <a:latin typeface="Raleway" panose="020B0604020202020204" charset="0"/>
+            </a:endParaRPr>
+          </a:p>
+          <a:p>
+            <a:endParaRPr lang="es-VE" dirty="0">
+              <a:latin typeface="Raleway" panose="020B0604020202020204" charset="0"/>
+            </a:endParaRPr>
+          </a:p>
+          <a:p>
             <a:r>
-              <a:rPr lang="es-VE" dirty="0">
+              <a:rPr lang="es-VE" b="1" dirty="0">
+                <a:solidFill>
+                  <a:srgbClr val="F7B617"/>
+                </a:solidFill>
                 <a:latin typeface="Raleway" panose="020B0604020202020204" charset="0"/>
               </a:rPr>
-              <a:t>Usar una escala de colores por categorías. </a:t>
+              <a:t>En nuestro ejemplo:</a:t>
             </a:r>
+            <a:endParaRPr lang="en-US" b="1" dirty="0">
+              <a:solidFill>
+                <a:srgbClr val="F7B617"/>
+              </a:solidFill>
+              <a:latin typeface="Raleway" panose="020B0604020202020204" charset="0"/>
+            </a:endParaRPr>
           </a:p>
         </p:txBody>
       </p:sp>
+      <p:sp>
+        <p:nvSpPr>
+          <p:cNvPr id="23" name="TextBox 22">
+            <a:extLst>
+              <a:ext uri="{FF2B5EF4-FFF2-40B4-BE49-F238E27FC236}">
+                <a16:creationId xmlns:a16="http://schemas.microsoft.com/office/drawing/2014/main" id="{1E5AE993-460C-45C2-8961-F5135A2364C9}"/>
+              </a:ext>
+            </a:extLst>
+          </p:cNvPr>
+          <p:cNvSpPr txBox="1"/>
+          <p:nvPr/>
+        </p:nvSpPr>
+        <p:spPr>
+          <a:xfrm>
+            <a:off x="2143437" y="1256962"/>
+            <a:ext cx="1338606" cy="738664"/>
+          </a:xfrm>
+          <a:prstGeom prst="rect">
+            <a:avLst/>
+          </a:prstGeom>
+          <a:noFill/>
+        </p:spPr>
+        <p:txBody>
+          <a:bodyPr wrap="square" rtlCol="0">
+            <a:spAutoFit/>
+          </a:bodyPr>
+          <a:lstStyle/>
+          <a:p>
+            <a:pPr algn="ctr"/>
+            <a:r>
+              <a:rPr lang="es-VE" b="1" dirty="0">
+                <a:latin typeface="Raleway" panose="020B0604020202020204" charset="0"/>
+              </a:rPr>
+              <a:t>Tamaño y forma del punto</a:t>
+            </a:r>
+            <a:endParaRPr lang="en-US" b="1" dirty="0">
+              <a:latin typeface="Raleway" panose="020B0604020202020204" charset="0"/>
+            </a:endParaRPr>
+          </a:p>
+        </p:txBody>
+      </p:sp>
+      <p:sp>
+        <p:nvSpPr>
+          <p:cNvPr id="31" name="TextBox 30">
+            <a:extLst>
+              <a:ext uri="{FF2B5EF4-FFF2-40B4-BE49-F238E27FC236}">
+                <a16:creationId xmlns:a16="http://schemas.microsoft.com/office/drawing/2014/main" id="{F2ABE337-23B0-4673-AEF4-BDCE9F7C53CC}"/>
+              </a:ext>
+            </a:extLst>
+          </p:cNvPr>
+          <p:cNvSpPr txBox="1"/>
+          <p:nvPr/>
+        </p:nvSpPr>
+        <p:spPr>
+          <a:xfrm>
+            <a:off x="666539" y="1626294"/>
+            <a:ext cx="1146922" cy="307777"/>
+          </a:xfrm>
+          <a:prstGeom prst="rect">
+            <a:avLst/>
+          </a:prstGeom>
+          <a:noFill/>
+        </p:spPr>
+        <p:txBody>
+          <a:bodyPr wrap="square" rtlCol="0">
+            <a:spAutoFit/>
+          </a:bodyPr>
+          <a:lstStyle/>
+          <a:p>
+            <a:pPr algn="ctr"/>
+            <a:r>
+              <a:rPr lang="es-VE" b="1" dirty="0">
+                <a:latin typeface="Raleway" panose="020B0604020202020204" charset="0"/>
+              </a:rPr>
+              <a:t>Colores</a:t>
+            </a:r>
+            <a:endParaRPr lang="en-US" b="1" dirty="0">
+              <a:latin typeface="Raleway" panose="020B0604020202020204" charset="0"/>
+            </a:endParaRPr>
+          </a:p>
+        </p:txBody>
+      </p:sp>
+      <p:cxnSp>
+        <p:nvCxnSpPr>
+          <p:cNvPr id="4" name="Straight Arrow Connector 3">
+            <a:extLst>
+              <a:ext uri="{FF2B5EF4-FFF2-40B4-BE49-F238E27FC236}">
+                <a16:creationId xmlns:a16="http://schemas.microsoft.com/office/drawing/2014/main" id="{5E6BB4EB-548F-4973-A477-3E3022402241}"/>
+              </a:ext>
+            </a:extLst>
+          </p:cNvPr>
+          <p:cNvCxnSpPr>
+            <a:cxnSpLocks/>
+          </p:cNvCxnSpPr>
+          <p:nvPr/>
+        </p:nvCxnSpPr>
+        <p:spPr>
+          <a:xfrm>
+            <a:off x="2529720" y="2253006"/>
+            <a:ext cx="676480" cy="0"/>
+          </a:xfrm>
+          <a:prstGeom prst="straightConnector1">
+            <a:avLst/>
+          </a:prstGeom>
+          <a:ln>
+            <a:solidFill>
+              <a:srgbClr val="F7B617"/>
+            </a:solidFill>
+            <a:headEnd type="triangle"/>
+            <a:tailEnd type="triangle"/>
+          </a:ln>
+        </p:spPr>
+        <p:style>
+          <a:lnRef idx="1">
+            <a:schemeClr val="accent1"/>
+          </a:lnRef>
+          <a:fillRef idx="0">
+            <a:schemeClr val="accent1"/>
+          </a:fillRef>
+          <a:effectRef idx="0">
+            <a:schemeClr val="accent1"/>
+          </a:effectRef>
+          <a:fontRef idx="minor">
+            <a:schemeClr val="tx1"/>
+          </a:fontRef>
+        </p:style>
+      </p:cxnSp>
       <p:pic>
         <p:nvPicPr>
-          <p:cNvPr id="4" name="Picture 3" descr="A close up of a map&#10;&#10;Description generated with high confidence">
+          <p:cNvPr id="11" name="Picture 10" descr="A screenshot of a cell phone&#10;&#10;Description generated with very high confidence">
             <a:extLst>
               <a:ext uri="{FF2B5EF4-FFF2-40B4-BE49-F238E27FC236}">
-                <a16:creationId xmlns:a16="http://schemas.microsoft.com/office/drawing/2014/main" id="{38526FE3-ED73-40F5-9782-2B9C877E69B3}"/>
+                <a16:creationId xmlns:a16="http://schemas.microsoft.com/office/drawing/2014/main" id="{E7A2AC1D-15A8-4E3E-81C2-0C5717BB5FE7}"/>
               </a:ext>
             </a:extLst>
           </p:cNvPr>
@@ -12889,25 +12823,193 @@
           <p:nvPr/>
         </p:nvPicPr>
         <p:blipFill>
-          <a:blip r:embed="rId4"/>
+          <a:blip r:embed="rId5"/>
           <a:stretch>
             <a:fillRect/>
           </a:stretch>
         </p:blipFill>
         <p:spPr>
           <a:xfrm>
-            <a:off x="131781" y="2031476"/>
-            <a:ext cx="3511296" cy="6858000"/>
+            <a:off x="4330836" y="4441677"/>
+            <a:ext cx="4287331" cy="2280176"/>
           </a:xfrm>
           <a:prstGeom prst="rect">
             <a:avLst/>
           </a:prstGeom>
         </p:spPr>
       </p:pic>
+      <p:cxnSp>
+        <p:nvCxnSpPr>
+          <p:cNvPr id="16" name="Straight Arrow Connector 15">
+            <a:extLst>
+              <a:ext uri="{FF2B5EF4-FFF2-40B4-BE49-F238E27FC236}">
+                <a16:creationId xmlns:a16="http://schemas.microsoft.com/office/drawing/2014/main" id="{FBBCB8A5-1E24-446F-BBFF-5DD4D248E2D9}"/>
+              </a:ext>
+            </a:extLst>
+          </p:cNvPr>
+          <p:cNvCxnSpPr>
+            <a:cxnSpLocks/>
+          </p:cNvCxnSpPr>
+          <p:nvPr/>
+        </p:nvCxnSpPr>
+        <p:spPr>
+          <a:xfrm flipV="1">
+            <a:off x="618469" y="1692897"/>
+            <a:ext cx="0" cy="2639272"/>
+          </a:xfrm>
+          <a:prstGeom prst="straightConnector1">
+            <a:avLst/>
+          </a:prstGeom>
+          <a:ln>
+            <a:solidFill>
+              <a:srgbClr val="F7B617"/>
+            </a:solidFill>
+            <a:tailEnd type="triangle"/>
+          </a:ln>
+        </p:spPr>
+        <p:style>
+          <a:lnRef idx="1">
+            <a:schemeClr val="accent1"/>
+          </a:lnRef>
+          <a:fillRef idx="0">
+            <a:schemeClr val="accent1"/>
+          </a:fillRef>
+          <a:effectRef idx="0">
+            <a:schemeClr val="accent1"/>
+          </a:effectRef>
+          <a:fontRef idx="minor">
+            <a:schemeClr val="tx1"/>
+          </a:fontRef>
+        </p:style>
+      </p:cxnSp>
+      <p:sp>
+        <p:nvSpPr>
+          <p:cNvPr id="17" name="TextBox 16">
+            <a:extLst>
+              <a:ext uri="{FF2B5EF4-FFF2-40B4-BE49-F238E27FC236}">
+                <a16:creationId xmlns:a16="http://schemas.microsoft.com/office/drawing/2014/main" id="{0029FFDD-A83F-44DC-91A7-0994919D6342}"/>
+              </a:ext>
+            </a:extLst>
+          </p:cNvPr>
+          <p:cNvSpPr txBox="1"/>
+          <p:nvPr/>
+        </p:nvSpPr>
+        <p:spPr>
+          <a:xfrm>
+            <a:off x="1065230" y="4395956"/>
+            <a:ext cx="1845632" cy="523220"/>
+          </a:xfrm>
+          <a:prstGeom prst="rect">
+            <a:avLst/>
+          </a:prstGeom>
+          <a:noFill/>
+        </p:spPr>
+        <p:txBody>
+          <a:bodyPr wrap="square" rtlCol="0">
+            <a:spAutoFit/>
+          </a:bodyPr>
+          <a:lstStyle/>
+          <a:p>
+            <a:pPr algn="ctr"/>
+            <a:r>
+              <a:rPr lang="es-VE" b="1" dirty="0">
+                <a:latin typeface="Raleway" panose="020B0604020202020204" charset="0"/>
+              </a:rPr>
+              <a:t>Eje X o abscisas: Dimensión 1</a:t>
+            </a:r>
+            <a:endParaRPr lang="en-US" b="1" dirty="0">
+              <a:latin typeface="Raleway" panose="020B0604020202020204" charset="0"/>
+            </a:endParaRPr>
+          </a:p>
+        </p:txBody>
+      </p:sp>
+      <p:cxnSp>
+        <p:nvCxnSpPr>
+          <p:cNvPr id="18" name="Straight Arrow Connector 17">
+            <a:extLst>
+              <a:ext uri="{FF2B5EF4-FFF2-40B4-BE49-F238E27FC236}">
+                <a16:creationId xmlns:a16="http://schemas.microsoft.com/office/drawing/2014/main" id="{EB1D6545-6893-4D2E-8065-DAD92EB40B02}"/>
+              </a:ext>
+            </a:extLst>
+          </p:cNvPr>
+          <p:cNvCxnSpPr/>
+          <p:nvPr/>
+        </p:nvCxnSpPr>
+        <p:spPr>
+          <a:xfrm>
+            <a:off x="626324" y="4288346"/>
+            <a:ext cx="2634343" cy="0"/>
+          </a:xfrm>
+          <a:prstGeom prst="straightConnector1">
+            <a:avLst/>
+          </a:prstGeom>
+          <a:ln>
+            <a:solidFill>
+              <a:srgbClr val="F7B617"/>
+            </a:solidFill>
+            <a:tailEnd type="triangle"/>
+          </a:ln>
+        </p:spPr>
+        <p:style>
+          <a:lnRef idx="1">
+            <a:schemeClr val="accent1"/>
+          </a:lnRef>
+          <a:fillRef idx="0">
+            <a:schemeClr val="accent1"/>
+          </a:fillRef>
+          <a:effectRef idx="0">
+            <a:schemeClr val="accent1"/>
+          </a:effectRef>
+          <a:fontRef idx="minor">
+            <a:schemeClr val="tx1"/>
+          </a:fontRef>
+        </p:style>
+      </p:cxnSp>
+      <p:sp>
+        <p:nvSpPr>
+          <p:cNvPr id="19" name="TextBox 18">
+            <a:extLst>
+              <a:ext uri="{FF2B5EF4-FFF2-40B4-BE49-F238E27FC236}">
+                <a16:creationId xmlns:a16="http://schemas.microsoft.com/office/drawing/2014/main" id="{AB813E25-94A6-46A6-A8F6-A20460CF7B8B}"/>
+              </a:ext>
+            </a:extLst>
+          </p:cNvPr>
+          <p:cNvSpPr txBox="1"/>
+          <p:nvPr/>
+        </p:nvSpPr>
+        <p:spPr>
+          <a:xfrm rot="16200000">
+            <a:off x="-714006" y="2932705"/>
+            <a:ext cx="1989857" cy="523220"/>
+          </a:xfrm>
+          <a:prstGeom prst="rect">
+            <a:avLst/>
+          </a:prstGeom>
+          <a:noFill/>
+        </p:spPr>
+        <p:txBody>
+          <a:bodyPr wrap="square" rtlCol="0">
+            <a:spAutoFit/>
+          </a:bodyPr>
+          <a:lstStyle/>
+          <a:p>
+            <a:pPr algn="ctr"/>
+            <a:r>
+              <a:rPr lang="es-VE" b="1" dirty="0">
+                <a:latin typeface="Raleway" panose="020B0604020202020204" charset="0"/>
+              </a:rPr>
+              <a:t>Eje Y o coordenadas: Valores</a:t>
+            </a:r>
+            <a:endParaRPr lang="en-US" b="1" dirty="0">
+              <a:latin typeface="Raleway" panose="020B0604020202020204" charset="0"/>
+            </a:endParaRPr>
+          </a:p>
+        </p:txBody>
+      </p:sp>
     </p:spTree>
     <p:extLst>
       <p:ext uri="{BB962C8B-B14F-4D97-AF65-F5344CB8AC3E}">
-        <p14:creationId xmlns:p14="http://schemas.microsoft.com/office/powerpoint/2010/main" val="812460515"/>
+        <p14:creationId xmlns:p14="http://schemas.microsoft.com/office/powerpoint/2010/main" val="1443424430"/>
       </p:ext>
     </p:extLst>
   </p:cSld>
@@ -13072,125 +13174,6 @@
           </a:p>
         </p:txBody>
       </p:sp>
-      <p:sp>
-        <p:nvSpPr>
-          <p:cNvPr id="2" name="TextBox 1">
-            <a:extLst>
-              <a:ext uri="{FF2B5EF4-FFF2-40B4-BE49-F238E27FC236}">
-                <a16:creationId xmlns:a16="http://schemas.microsoft.com/office/drawing/2014/main" id="{B441D002-04CF-4BB4-A845-BC7D54240BCD}"/>
-              </a:ext>
-            </a:extLst>
-          </p:cNvPr>
-          <p:cNvSpPr txBox="1"/>
-          <p:nvPr/>
-        </p:nvSpPr>
-        <p:spPr>
-          <a:xfrm>
-            <a:off x="3855563" y="1842940"/>
-            <a:ext cx="4515439" cy="2893100"/>
-          </a:xfrm>
-          <a:prstGeom prst="rect">
-            <a:avLst/>
-          </a:prstGeom>
-          <a:noFill/>
-        </p:spPr>
-        <p:txBody>
-          <a:bodyPr wrap="square" rtlCol="0">
-            <a:spAutoFit/>
-          </a:bodyPr>
-          <a:lstStyle/>
-          <a:p>
-            <a:r>
-              <a:rPr lang="es-VE" b="1" dirty="0">
-                <a:solidFill>
-                  <a:srgbClr val="F7B617"/>
-                </a:solidFill>
-                <a:latin typeface="Raleway" panose="020B0604020202020204" charset="0"/>
-              </a:rPr>
-              <a:t>Cuando se usa:</a:t>
-            </a:r>
-          </a:p>
-          <a:p>
-            <a:pPr marL="285750" indent="-285750">
-              <a:buFont typeface="Arial" panose="020B0604020202020204" pitchFamily="34" charset="0"/>
-              <a:buChar char="•"/>
-            </a:pPr>
-            <a:r>
-              <a:rPr lang="es-VE" dirty="0">
-                <a:latin typeface="Raleway" panose="020B0604020202020204" charset="0"/>
-              </a:rPr>
-              <a:t>Para mostrar la proporción de una dimensión respecto a toda la serie de datos. </a:t>
-            </a:r>
-          </a:p>
-          <a:p>
-            <a:endParaRPr lang="es-VE" dirty="0">
-              <a:latin typeface="Raleway" panose="020B0604020202020204" charset="0"/>
-            </a:endParaRPr>
-          </a:p>
-          <a:p>
-            <a:r>
-              <a:rPr lang="es-VE" dirty="0">
-                <a:latin typeface="Raleway" panose="020B0604020202020204" charset="0"/>
-              </a:rPr>
-              <a:t>Elementos:</a:t>
-            </a:r>
-          </a:p>
-          <a:p>
-            <a:pPr marL="285750" indent="-285750">
-              <a:buFont typeface="Arial" panose="020B0604020202020204" pitchFamily="34" charset="0"/>
-              <a:buChar char="•"/>
-            </a:pPr>
-            <a:endParaRPr lang="es-VE" dirty="0">
-              <a:latin typeface="Raleway" panose="020B0604020202020204" charset="0"/>
-            </a:endParaRPr>
-          </a:p>
-          <a:p>
-            <a:endParaRPr lang="es-VE" dirty="0">
-              <a:latin typeface="Raleway" panose="020B0604020202020204" charset="0"/>
-            </a:endParaRPr>
-          </a:p>
-          <a:p>
-            <a:endParaRPr lang="es-VE" dirty="0">
-              <a:latin typeface="Raleway" panose="020B0604020202020204" charset="0"/>
-            </a:endParaRPr>
-          </a:p>
-          <a:p>
-            <a:r>
-              <a:rPr lang="es-VE" b="1" dirty="0">
-                <a:solidFill>
-                  <a:srgbClr val="F7B617"/>
-                </a:solidFill>
-                <a:latin typeface="Raleway" panose="020B0604020202020204" charset="0"/>
-              </a:rPr>
-              <a:t>Recomendaciones:</a:t>
-            </a:r>
-          </a:p>
-          <a:p>
-            <a:pPr marL="285750" indent="-285750">
-              <a:buFont typeface="Arial" panose="020B0604020202020204" pitchFamily="34" charset="0"/>
-              <a:buChar char="•"/>
-            </a:pPr>
-            <a:r>
-              <a:rPr lang="es-VE" dirty="0">
-                <a:latin typeface="Raleway" panose="020B0604020202020204" charset="0"/>
-              </a:rPr>
-              <a:t>No usar más de 7 categorías, en caso de haber más agrupar las pequeñas en una categoría: Otros. </a:t>
-            </a:r>
-          </a:p>
-          <a:p>
-            <a:pPr marL="285750" indent="-285750">
-              <a:buFont typeface="Arial" panose="020B0604020202020204" pitchFamily="34" charset="0"/>
-              <a:buChar char="•"/>
-            </a:pPr>
-            <a:r>
-              <a:rPr lang="es-VE" dirty="0">
-                <a:latin typeface="Raleway" panose="020B0604020202020204" charset="0"/>
-              </a:rPr>
-              <a:t>Usar una escala de colores por categorías. </a:t>
-            </a:r>
-          </a:p>
-        </p:txBody>
-      </p:sp>
       <p:pic>
         <p:nvPicPr>
           <p:cNvPr id="4" name="Picture 3" descr="A close up of a map&#10;&#10;Description generated with high confidence">
@@ -13212,218 +13195,20 @@
         </p:blipFill>
         <p:spPr>
           <a:xfrm>
-            <a:off x="941614" y="2292682"/>
-            <a:ext cx="1188348" cy="1038347"/>
+            <a:off x="2987230" y="2127713"/>
+            <a:ext cx="3385289" cy="2957976"/>
           </a:xfrm>
           <a:prstGeom prst="rect">
             <a:avLst/>
           </a:prstGeom>
-        </p:spPr>
-      </p:pic>
-      <p:pic>
-        <p:nvPicPr>
-          <p:cNvPr id="7" name="Picture 6" descr="A close up of a device&#10;&#10;Description generated with high confidence">
-            <a:extLst>
-              <a:ext uri="{FF2B5EF4-FFF2-40B4-BE49-F238E27FC236}">
-                <a16:creationId xmlns:a16="http://schemas.microsoft.com/office/drawing/2014/main" id="{76ECBF6F-C2EE-4F6C-BB61-CAF322B02B82}"/>
-              </a:ext>
-            </a:extLst>
-          </p:cNvPr>
-          <p:cNvPicPr>
-            <a:picLocks noChangeAspect="1"/>
-          </p:cNvPicPr>
-          <p:nvPr/>
-        </p:nvPicPr>
-        <p:blipFill>
-          <a:blip r:embed="rId5"/>
-          <a:stretch>
-            <a:fillRect/>
-          </a:stretch>
-        </p:blipFill>
-        <p:spPr>
-          <a:xfrm>
-            <a:off x="5100748" y="1567543"/>
-            <a:ext cx="5288875" cy="6858000"/>
-          </a:xfrm>
-          <a:prstGeom prst="rect">
-            <a:avLst/>
-          </a:prstGeom>
-        </p:spPr>
-      </p:pic>
-    </p:spTree>
-    <p:extLst>
-      <p:ext uri="{BB962C8B-B14F-4D97-AF65-F5344CB8AC3E}">
-        <p14:creationId xmlns:p14="http://schemas.microsoft.com/office/powerpoint/2010/main" val="633431925"/>
-      </p:ext>
-    </p:extLst>
-  </p:cSld>
-  <p:clrMapOvr>
-    <a:masterClrMapping/>
-  </p:clrMapOvr>
-</p:sld>
-</file>
-
-<file path=ppt/slides/slide7.xml><?xml version="1.0" encoding="utf-8"?>
-<p:sld xmlns:a="http://schemas.openxmlformats.org/drawingml/2006/main" xmlns:r="http://schemas.openxmlformats.org/officeDocument/2006/relationships" xmlns:p="http://schemas.openxmlformats.org/presentationml/2006/main">
-  <p:cSld>
-    <p:spTree>
-      <p:nvGrpSpPr>
-        <p:cNvPr id="1" name="Shape 392"/>
-        <p:cNvGrpSpPr/>
-        <p:nvPr/>
-      </p:nvGrpSpPr>
-      <p:grpSpPr>
-        <a:xfrm>
-          <a:off x="0" y="0"/>
-          <a:ext cx="0" cy="0"/>
-          <a:chOff x="0" y="0"/>
-          <a:chExt cx="0" cy="0"/>
-        </a:xfrm>
-      </p:grpSpPr>
-      <p:sp>
-        <p:nvSpPr>
-          <p:cNvPr id="394" name="Shape 394"/>
-          <p:cNvSpPr txBox="1">
-            <a:spLocks noGrp="1"/>
-          </p:cNvSpPr>
-          <p:nvPr>
-            <p:ph type="title"/>
-          </p:nvPr>
-        </p:nvSpPr>
-        <p:spPr>
-          <a:xfrm>
-            <a:off x="666539" y="209956"/>
-            <a:ext cx="5192220" cy="428400"/>
-          </a:xfrm>
-          <a:prstGeom prst="rect">
-            <a:avLst/>
-          </a:prstGeom>
-          <a:noFill/>
-          <a:ln>
-            <a:noFill/>
-          </a:ln>
-        </p:spPr>
-        <p:txBody>
-          <a:bodyPr lIns="91425" tIns="45700" rIns="91425" bIns="45700" anchor="ctr" anchorCtr="0">
-            <a:noAutofit/>
-          </a:bodyPr>
-          <a:lstStyle/>
-          <a:p>
-            <a:pPr marL="0" marR="0" lvl="0" indent="0" algn="l" rtl="0">
-              <a:spcBef>
-                <a:spcPts val="0"/>
-              </a:spcBef>
-              <a:buClr>
-                <a:srgbClr val="F7B600"/>
-              </a:buClr>
-              <a:buSzPct val="25000"/>
-              <a:buFont typeface="Arial"/>
-              <a:buNone/>
-            </a:pPr>
-            <a:r>
-              <a:rPr lang="es-VE" sz="1200" i="0" u="none" strike="noStrike" cap="none" dirty="0">
-                <a:solidFill>
-                  <a:srgbClr val="F7B600"/>
-                </a:solidFill>
-                <a:latin typeface="Montserrat"/>
-                <a:ea typeface="Montserrat"/>
-                <a:cs typeface="Montserrat"/>
-                <a:sym typeface="Montserrat"/>
-              </a:rPr>
-              <a:t>4.2 Visualizaciones Tradicionales</a:t>
-            </a:r>
-          </a:p>
-        </p:txBody>
-      </p:sp>
-      <p:pic>
-        <p:nvPicPr>
-          <p:cNvPr id="395" name="Shape 395" descr="isotipo codeacademy.png"/>
-          <p:cNvPicPr preferRelativeResize="0"/>
-          <p:nvPr/>
-        </p:nvPicPr>
-        <p:blipFill rotWithShape="1">
-          <a:blip r:embed="rId3">
-            <a:alphaModFix/>
-          </a:blip>
-          <a:srcRect/>
-          <a:stretch/>
-        </p:blipFill>
-        <p:spPr>
-          <a:xfrm>
-            <a:off x="131781" y="126082"/>
-            <a:ext cx="548100" cy="548100"/>
-          </a:xfrm>
-          <a:prstGeom prst="rect">
-            <a:avLst/>
-          </a:prstGeom>
-          <a:noFill/>
-          <a:ln>
-            <a:noFill/>
-          </a:ln>
         </p:spPr>
       </p:pic>
       <p:sp>
         <p:nvSpPr>
-          <p:cNvPr id="396" name="Shape 396"/>
-          <p:cNvSpPr txBox="1"/>
-          <p:nvPr/>
-        </p:nvSpPr>
-        <p:spPr>
-          <a:xfrm>
-            <a:off x="1117077" y="674182"/>
-            <a:ext cx="8097624" cy="646200"/>
-          </a:xfrm>
-          <a:prstGeom prst="rect">
-            <a:avLst/>
-          </a:prstGeom>
-          <a:noFill/>
-          <a:ln>
-            <a:noFill/>
-          </a:ln>
-        </p:spPr>
-        <p:txBody>
-          <a:bodyPr lIns="91425" tIns="45700" rIns="91425" bIns="45700" anchor="t" anchorCtr="0">
-            <a:noAutofit/>
-          </a:bodyPr>
-          <a:lstStyle/>
-          <a:p>
-            <a:pPr marL="0" marR="0" lvl="0" indent="0" algn="l" rtl="0">
-              <a:spcBef>
-                <a:spcPts val="0"/>
-              </a:spcBef>
-              <a:buSzPct val="25000"/>
-              <a:buNone/>
-            </a:pPr>
-            <a:r>
-              <a:rPr lang="es-GT" sz="3600" dirty="0">
-                <a:solidFill>
-                  <a:srgbClr val="F7B600"/>
-                </a:solidFill>
-                <a:latin typeface="Raleway"/>
-                <a:ea typeface="Raleway"/>
-                <a:cs typeface="Raleway"/>
-                <a:sym typeface="Raleway"/>
-              </a:rPr>
-              <a:t>Fuentes</a:t>
-            </a:r>
-            <a:endParaRPr lang="es-GT" sz="3600" b="0" i="0" u="none" strike="noStrike" cap="none" dirty="0">
-              <a:solidFill>
-                <a:srgbClr val="F7B600"/>
-              </a:solidFill>
-              <a:latin typeface="Raleway"/>
-              <a:ea typeface="Raleway"/>
-              <a:cs typeface="Raleway"/>
-              <a:sym typeface="Raleway"/>
-            </a:endParaRPr>
-          </a:p>
-        </p:txBody>
-      </p:sp>
-      <p:sp>
-        <p:nvSpPr>
-          <p:cNvPr id="2" name="TextBox 1">
+          <p:cNvPr id="8" name="TextBox 7">
             <a:extLst>
               <a:ext uri="{FF2B5EF4-FFF2-40B4-BE49-F238E27FC236}">
-                <a16:creationId xmlns:a16="http://schemas.microsoft.com/office/drawing/2014/main" id="{B441D002-04CF-4BB4-A845-BC7D54240BCD}"/>
+                <a16:creationId xmlns:a16="http://schemas.microsoft.com/office/drawing/2014/main" id="{EEC6EC94-8633-41C5-B284-64E7B1022B45}"/>
               </a:ext>
             </a:extLst>
           </p:cNvPr>
@@ -13432,8 +13217,8 @@
         </p:nvSpPr>
         <p:spPr>
           <a:xfrm>
-            <a:off x="3855563" y="1842940"/>
-            <a:ext cx="4515439" cy="2893100"/>
+            <a:off x="3605753" y="5300930"/>
+            <a:ext cx="1845632" cy="307777"/>
           </a:xfrm>
           <a:prstGeom prst="rect">
             <a:avLst/>
@@ -13446,2660 +13231,23 @@
           </a:bodyPr>
           <a:lstStyle/>
           <a:p>
+            <a:pPr algn="ctr"/>
             <a:r>
               <a:rPr lang="es-VE" b="1" dirty="0">
-                <a:solidFill>
-                  <a:srgbClr val="F7B617"/>
-                </a:solidFill>
                 <a:latin typeface="Raleway" panose="020B0604020202020204" charset="0"/>
               </a:rPr>
-              <a:t>Cuando se usa:</a:t>
+              <a:t>Gráfico de Áreas</a:t>
             </a:r>
-          </a:p>
-          <a:p>
-            <a:pPr marL="285750" indent="-285750">
-              <a:buFont typeface="Arial" panose="020B0604020202020204" pitchFamily="34" charset="0"/>
-              <a:buChar char="•"/>
-            </a:pPr>
-            <a:r>
-              <a:rPr lang="es-VE" dirty="0">
-                <a:latin typeface="Raleway" panose="020B0604020202020204" charset="0"/>
-              </a:rPr>
-              <a:t>Para mostrar la proporción de una dimensión respecto a toda la serie de datos. </a:t>
-            </a:r>
-          </a:p>
-          <a:p>
-            <a:endParaRPr lang="es-VE" dirty="0">
+            <a:endParaRPr lang="en-US" b="1" dirty="0">
               <a:latin typeface="Raleway" panose="020B0604020202020204" charset="0"/>
             </a:endParaRPr>
-          </a:p>
-          <a:p>
-            <a:r>
-              <a:rPr lang="es-VE" dirty="0">
-                <a:latin typeface="Raleway" panose="020B0604020202020204" charset="0"/>
-              </a:rPr>
-              <a:t>Elementos:</a:t>
-            </a:r>
-          </a:p>
-          <a:p>
-            <a:pPr marL="285750" indent="-285750">
-              <a:buFont typeface="Arial" panose="020B0604020202020204" pitchFamily="34" charset="0"/>
-              <a:buChar char="•"/>
-            </a:pPr>
-            <a:endParaRPr lang="es-VE" dirty="0">
-              <a:latin typeface="Raleway" panose="020B0604020202020204" charset="0"/>
-            </a:endParaRPr>
-          </a:p>
-          <a:p>
-            <a:endParaRPr lang="es-VE" dirty="0">
-              <a:latin typeface="Raleway" panose="020B0604020202020204" charset="0"/>
-            </a:endParaRPr>
-          </a:p>
-          <a:p>
-            <a:endParaRPr lang="es-VE" dirty="0">
-              <a:latin typeface="Raleway" panose="020B0604020202020204" charset="0"/>
-            </a:endParaRPr>
-          </a:p>
-          <a:p>
-            <a:r>
-              <a:rPr lang="es-VE" b="1" dirty="0">
-                <a:solidFill>
-                  <a:srgbClr val="F7B617"/>
-                </a:solidFill>
-                <a:latin typeface="Raleway" panose="020B0604020202020204" charset="0"/>
-              </a:rPr>
-              <a:t>Recomendaciones:</a:t>
-            </a:r>
-          </a:p>
-          <a:p>
-            <a:pPr marL="285750" indent="-285750">
-              <a:buFont typeface="Arial" panose="020B0604020202020204" pitchFamily="34" charset="0"/>
-              <a:buChar char="•"/>
-            </a:pPr>
-            <a:r>
-              <a:rPr lang="es-VE" dirty="0">
-                <a:latin typeface="Raleway" panose="020B0604020202020204" charset="0"/>
-              </a:rPr>
-              <a:t>No usar más de 7 categorías, en caso de haber más agrupar las pequeñas en una categoría: Otros. </a:t>
-            </a:r>
-          </a:p>
-          <a:p>
-            <a:pPr marL="285750" indent="-285750">
-              <a:buFont typeface="Arial" panose="020B0604020202020204" pitchFamily="34" charset="0"/>
-              <a:buChar char="•"/>
-            </a:pPr>
-            <a:r>
-              <a:rPr lang="es-VE" dirty="0">
-                <a:latin typeface="Raleway" panose="020B0604020202020204" charset="0"/>
-              </a:rPr>
-              <a:t>Usar una escala de colores por categorías. </a:t>
-            </a:r>
-          </a:p>
-        </p:txBody>
-      </p:sp>
-      <p:pic>
-        <p:nvPicPr>
-          <p:cNvPr id="4" name="Picture 3" descr="A close up of a map&#10;&#10;Description generated with high confidence">
-            <a:extLst>
-              <a:ext uri="{FF2B5EF4-FFF2-40B4-BE49-F238E27FC236}">
-                <a16:creationId xmlns:a16="http://schemas.microsoft.com/office/drawing/2014/main" id="{38526FE3-ED73-40F5-9782-2B9C877E69B3}"/>
-              </a:ext>
-            </a:extLst>
-          </p:cNvPr>
-          <p:cNvPicPr>
-            <a:picLocks noChangeAspect="1"/>
-          </p:cNvPicPr>
-          <p:nvPr/>
-        </p:nvPicPr>
-        <p:blipFill rotWithShape="1">
-          <a:blip r:embed="rId4"/>
-          <a:srcRect l="66157" t="24187" b="60672"/>
-          <a:stretch/>
-        </p:blipFill>
-        <p:spPr>
-          <a:xfrm>
-            <a:off x="941614" y="2292682"/>
-            <a:ext cx="1188348" cy="1038347"/>
-          </a:xfrm>
-          <a:prstGeom prst="rect">
-            <a:avLst/>
-          </a:prstGeom>
-        </p:spPr>
-      </p:pic>
-      <p:pic>
-        <p:nvPicPr>
-          <p:cNvPr id="7" name="Picture 6" descr="A close up of a device&#10;&#10;Description generated with high confidence">
-            <a:extLst>
-              <a:ext uri="{FF2B5EF4-FFF2-40B4-BE49-F238E27FC236}">
-                <a16:creationId xmlns:a16="http://schemas.microsoft.com/office/drawing/2014/main" id="{76ECBF6F-C2EE-4F6C-BB61-CAF322B02B82}"/>
-              </a:ext>
-            </a:extLst>
-          </p:cNvPr>
-          <p:cNvPicPr>
-            <a:picLocks noChangeAspect="1"/>
-          </p:cNvPicPr>
-          <p:nvPr/>
-        </p:nvPicPr>
-        <p:blipFill>
-          <a:blip r:embed="rId5"/>
-          <a:stretch>
-            <a:fillRect/>
-          </a:stretch>
-        </p:blipFill>
-        <p:spPr>
-          <a:xfrm>
-            <a:off x="5100748" y="1567543"/>
-            <a:ext cx="5288875" cy="6858000"/>
-          </a:xfrm>
-          <a:prstGeom prst="rect">
-            <a:avLst/>
-          </a:prstGeom>
-        </p:spPr>
-      </p:pic>
-    </p:spTree>
-    <p:extLst>
-      <p:ext uri="{BB962C8B-B14F-4D97-AF65-F5344CB8AC3E}">
-        <p14:creationId xmlns:p14="http://schemas.microsoft.com/office/powerpoint/2010/main" val="2373987170"/>
-      </p:ext>
-    </p:extLst>
-  </p:cSld>
-  <p:clrMapOvr>
-    <a:masterClrMapping/>
-  </p:clrMapOvr>
-</p:sld>
-</file>
-
-<file path=ppt/slides/slide8.xml><?xml version="1.0" encoding="utf-8"?>
-<p:sld xmlns:a="http://schemas.openxmlformats.org/drawingml/2006/main" xmlns:r="http://schemas.openxmlformats.org/officeDocument/2006/relationships" xmlns:p="http://schemas.openxmlformats.org/presentationml/2006/main">
-  <p:cSld>
-    <p:spTree>
-      <p:nvGrpSpPr>
-        <p:cNvPr id="1" name="Shape 392"/>
-        <p:cNvGrpSpPr/>
-        <p:nvPr/>
-      </p:nvGrpSpPr>
-      <p:grpSpPr>
-        <a:xfrm>
-          <a:off x="0" y="0"/>
-          <a:ext cx="0" cy="0"/>
-          <a:chOff x="0" y="0"/>
-          <a:chExt cx="0" cy="0"/>
-        </a:xfrm>
-      </p:grpSpPr>
-      <p:sp>
-        <p:nvSpPr>
-          <p:cNvPr id="393" name="Shape 393"/>
-          <p:cNvSpPr txBox="1">
-            <a:spLocks noGrp="1"/>
-          </p:cNvSpPr>
-          <p:nvPr>
-            <p:ph type="body" idx="1"/>
-          </p:nvPr>
-        </p:nvSpPr>
-        <p:spPr>
-          <a:xfrm>
-            <a:off x="457200" y="1628481"/>
-            <a:ext cx="8229600" cy="4526100"/>
-          </a:xfrm>
-          <a:prstGeom prst="rect">
-            <a:avLst/>
-          </a:prstGeom>
-          <a:noFill/>
-          <a:ln>
-            <a:noFill/>
-          </a:ln>
-        </p:spPr>
-        <p:txBody>
-          <a:bodyPr lIns="91425" tIns="45700" rIns="91425" bIns="45700" anchor="t" anchorCtr="0">
-            <a:noAutofit/>
-          </a:bodyPr>
-          <a:lstStyle/>
-          <a:p>
-            <a:pPr marL="0" lvl="0" indent="0">
-              <a:lnSpc>
-                <a:spcPct val="90000"/>
-              </a:lnSpc>
-              <a:spcBef>
-                <a:spcPts val="0"/>
-              </a:spcBef>
-              <a:buSzPct val="25000"/>
-              <a:buNone/>
-            </a:pPr>
-            <a:r>
-              <a:rPr lang="es-VE" sz="1850" dirty="0">
-                <a:hlinkClick r:id="rId3"/>
-              </a:rPr>
-              <a:t>https://docs.tibco.com/pub/spotfire_web_player/6.5.0/doc/html/es_ES/GUID-6023CECC-E502-4AE1-B5C5-FFE5DAF6FAE2.html</a:t>
-            </a:r>
-            <a:endParaRPr lang="es-VE" sz="1850" dirty="0"/>
-          </a:p>
-          <a:p>
-            <a:pPr marL="0" lvl="0" indent="0">
-              <a:lnSpc>
-                <a:spcPct val="90000"/>
-              </a:lnSpc>
-              <a:spcBef>
-                <a:spcPts val="0"/>
-              </a:spcBef>
-              <a:buSzPct val="25000"/>
-              <a:buNone/>
-            </a:pPr>
-            <a:endParaRPr lang="es-VE" sz="1850" dirty="0"/>
-          </a:p>
-          <a:p>
-            <a:pPr marL="0" lvl="0" indent="0">
-              <a:lnSpc>
-                <a:spcPct val="90000"/>
-              </a:lnSpc>
-              <a:spcBef>
-                <a:spcPts val="0"/>
-              </a:spcBef>
-              <a:buSzPct val="25000"/>
-              <a:buNone/>
-            </a:pPr>
-            <a:endParaRPr lang="es-VE" sz="1850" dirty="0"/>
-          </a:p>
-          <a:p>
-            <a:pPr marL="0" lvl="0" indent="0">
-              <a:lnSpc>
-                <a:spcPct val="90000"/>
-              </a:lnSpc>
-              <a:spcBef>
-                <a:spcPts val="0"/>
-              </a:spcBef>
-              <a:buSzPct val="25000"/>
-              <a:buNone/>
-            </a:pPr>
-            <a:r>
-              <a:rPr lang="es-VE" sz="1850" dirty="0">
-                <a:hlinkClick r:id="rId4"/>
-              </a:rPr>
-              <a:t>http://www2.microstrategy.com/producthelp/9.3/WebUser/WebHelp/Lang_3082/About_visualizations.htm</a:t>
-            </a:r>
-            <a:endParaRPr lang="es-VE" sz="1850" dirty="0"/>
-          </a:p>
-          <a:p>
-            <a:pPr marL="0" lvl="0" indent="0">
-              <a:lnSpc>
-                <a:spcPct val="90000"/>
-              </a:lnSpc>
-              <a:spcBef>
-                <a:spcPts val="0"/>
-              </a:spcBef>
-              <a:buSzPct val="25000"/>
-              <a:buNone/>
-            </a:pPr>
-            <a:endParaRPr lang="es-VE" sz="1850" dirty="0"/>
-          </a:p>
-          <a:p>
-            <a:pPr marL="0" lvl="0" indent="0">
-              <a:lnSpc>
-                <a:spcPct val="90000"/>
-              </a:lnSpc>
-              <a:spcBef>
-                <a:spcPts val="0"/>
-              </a:spcBef>
-              <a:buSzPct val="25000"/>
-              <a:buNone/>
-            </a:pPr>
-            <a:endParaRPr lang="es-VE" sz="1850" dirty="0"/>
-          </a:p>
-        </p:txBody>
-      </p:sp>
-      <p:sp>
-        <p:nvSpPr>
-          <p:cNvPr id="394" name="Shape 394"/>
-          <p:cNvSpPr txBox="1">
-            <a:spLocks noGrp="1"/>
-          </p:cNvSpPr>
-          <p:nvPr>
-            <p:ph type="title"/>
-          </p:nvPr>
-        </p:nvSpPr>
-        <p:spPr>
-          <a:xfrm>
-            <a:off x="666539" y="209956"/>
-            <a:ext cx="5192220" cy="428400"/>
-          </a:xfrm>
-          <a:prstGeom prst="rect">
-            <a:avLst/>
-          </a:prstGeom>
-          <a:noFill/>
-          <a:ln>
-            <a:noFill/>
-          </a:ln>
-        </p:spPr>
-        <p:txBody>
-          <a:bodyPr lIns="91425" tIns="45700" rIns="91425" bIns="45700" anchor="ctr" anchorCtr="0">
-            <a:noAutofit/>
-          </a:bodyPr>
-          <a:lstStyle/>
-          <a:p>
-            <a:pPr marL="0" marR="0" lvl="0" indent="0" algn="l" rtl="0">
-              <a:spcBef>
-                <a:spcPts val="0"/>
-              </a:spcBef>
-              <a:buClr>
-                <a:srgbClr val="F7B600"/>
-              </a:buClr>
-              <a:buSzPct val="25000"/>
-              <a:buFont typeface="Arial"/>
-              <a:buNone/>
-            </a:pPr>
-            <a:r>
-              <a:rPr lang="es-VE" sz="1200" i="0" u="none" strike="noStrike" cap="none" dirty="0">
-                <a:solidFill>
-                  <a:srgbClr val="F7B600"/>
-                </a:solidFill>
-                <a:latin typeface="Montserrat"/>
-                <a:ea typeface="Montserrat"/>
-                <a:cs typeface="Montserrat"/>
-                <a:sym typeface="Montserrat"/>
-              </a:rPr>
-              <a:t>4.1 Tipo de Visualizaciones</a:t>
-            </a:r>
-          </a:p>
-        </p:txBody>
-      </p:sp>
-      <p:pic>
-        <p:nvPicPr>
-          <p:cNvPr id="395" name="Shape 395" descr="isotipo codeacademy.png"/>
-          <p:cNvPicPr preferRelativeResize="0"/>
-          <p:nvPr/>
-        </p:nvPicPr>
-        <p:blipFill rotWithShape="1">
-          <a:blip r:embed="rId5">
-            <a:alphaModFix/>
-          </a:blip>
-          <a:srcRect/>
-          <a:stretch/>
-        </p:blipFill>
-        <p:spPr>
-          <a:xfrm>
-            <a:off x="131781" y="126082"/>
-            <a:ext cx="548100" cy="548100"/>
-          </a:xfrm>
-          <a:prstGeom prst="rect">
-            <a:avLst/>
-          </a:prstGeom>
-          <a:noFill/>
-          <a:ln>
-            <a:noFill/>
-          </a:ln>
-        </p:spPr>
-      </p:pic>
-      <p:sp>
-        <p:nvSpPr>
-          <p:cNvPr id="396" name="Shape 396"/>
-          <p:cNvSpPr txBox="1"/>
-          <p:nvPr/>
-        </p:nvSpPr>
-        <p:spPr>
-          <a:xfrm>
-            <a:off x="1117077" y="674182"/>
-            <a:ext cx="7107810" cy="646200"/>
-          </a:xfrm>
-          <a:prstGeom prst="rect">
-            <a:avLst/>
-          </a:prstGeom>
-          <a:noFill/>
-          <a:ln>
-            <a:noFill/>
-          </a:ln>
-        </p:spPr>
-        <p:txBody>
-          <a:bodyPr lIns="91425" tIns="45700" rIns="91425" bIns="45700" anchor="t" anchorCtr="0">
-            <a:noAutofit/>
-          </a:bodyPr>
-          <a:lstStyle/>
-          <a:p>
-            <a:pPr marL="0" marR="0" lvl="0" indent="0" algn="l" rtl="0">
-              <a:spcBef>
-                <a:spcPts val="0"/>
-              </a:spcBef>
-              <a:buSzPct val="25000"/>
-              <a:buNone/>
-            </a:pPr>
-            <a:r>
-              <a:rPr lang="es-GT" sz="3600" dirty="0">
-                <a:solidFill>
-                  <a:srgbClr val="F7B600"/>
-                </a:solidFill>
-                <a:latin typeface="Raleway"/>
-                <a:ea typeface="Raleway"/>
-                <a:cs typeface="Raleway"/>
-                <a:sym typeface="Raleway"/>
-              </a:rPr>
-              <a:t>Tipo de Visualizaciones</a:t>
-            </a:r>
-            <a:endParaRPr lang="es-GT" sz="3600" b="0" i="0" u="none" strike="noStrike" cap="none" dirty="0">
-              <a:solidFill>
-                <a:srgbClr val="F7B600"/>
-              </a:solidFill>
-              <a:latin typeface="Raleway"/>
-              <a:ea typeface="Raleway"/>
-              <a:cs typeface="Raleway"/>
-              <a:sym typeface="Raleway"/>
-            </a:endParaRPr>
-          </a:p>
-        </p:txBody>
-      </p:sp>
-      <p:graphicFrame>
-        <p:nvGraphicFramePr>
-          <p:cNvPr id="2" name="Table 1">
-            <a:extLst>
-              <a:ext uri="{FF2B5EF4-FFF2-40B4-BE49-F238E27FC236}">
-                <a16:creationId xmlns:a16="http://schemas.microsoft.com/office/drawing/2014/main" id="{EF415DA0-F010-4F5E-90E2-6A68CD7CBE7B}"/>
-              </a:ext>
-            </a:extLst>
-          </p:cNvPr>
-          <p:cNvGraphicFramePr>
-            <a:graphicFrameLocks noGrp="1"/>
-          </p:cNvGraphicFramePr>
-          <p:nvPr/>
-        </p:nvGraphicFramePr>
-        <p:xfrm>
-          <a:off x="3864622" y="1600200"/>
-          <a:ext cx="1414756" cy="4525962"/>
-        </p:xfrm>
-        <a:graphic>
-          <a:graphicData uri="http://schemas.openxmlformats.org/drawingml/2006/table">
-            <a:tbl>
-              <a:tblPr/>
-              <a:tblGrid>
-                <a:gridCol w="707378">
-                  <a:extLst>
-                    <a:ext uri="{9D8B030D-6E8A-4147-A177-3AD203B41FA5}">
-                      <a16:colId xmlns:a16="http://schemas.microsoft.com/office/drawing/2014/main" val="2739725074"/>
-                    </a:ext>
-                  </a:extLst>
-                </a:gridCol>
-                <a:gridCol w="707378">
-                  <a:extLst>
-                    <a:ext uri="{9D8B030D-6E8A-4147-A177-3AD203B41FA5}">
-                      <a16:colId xmlns:a16="http://schemas.microsoft.com/office/drawing/2014/main" val="3641571771"/>
-                    </a:ext>
-                  </a:extLst>
-                </a:gridCol>
-              </a:tblGrid>
-              <a:tr h="220182">
-                <a:tc>
-                  <a:txBody>
-                    <a:bodyPr/>
-                    <a:lstStyle/>
-                    <a:p>
-                      <a:pPr algn="l" fontAlgn="t"/>
-                      <a:r>
-                        <a:rPr lang="en-US" sz="600">
-                          <a:effectLst/>
-                        </a:rPr>
-                        <a:t>rpose of visualization</a:t>
-                      </a:r>
-                    </a:p>
-                  </a:txBody>
-                  <a:tcPr marL="12232" marR="12232" marT="12232" marB="12232">
-                    <a:lnL w="3810" cap="flat" cmpd="sng" algn="ctr">
-                      <a:solidFill>
-                        <a:srgbClr val="D5D5D5"/>
-                      </a:solidFill>
-                      <a:prstDash val="solid"/>
-                      <a:round/>
-                      <a:headEnd type="none" w="med" len="med"/>
-                      <a:tailEnd type="none" w="med" len="med"/>
-                    </a:lnL>
-                    <a:lnR w="3810" cap="flat" cmpd="sng" algn="ctr">
-                      <a:solidFill>
-                        <a:srgbClr val="D5D5D5"/>
-                      </a:solidFill>
-                      <a:prstDash val="solid"/>
-                      <a:round/>
-                      <a:headEnd type="none" w="med" len="med"/>
-                      <a:tailEnd type="none" w="med" len="med"/>
-                    </a:lnR>
-                    <a:lnT w="3810" cap="flat" cmpd="sng" algn="ctr">
-                      <a:solidFill>
-                        <a:srgbClr val="D5D5D5"/>
-                      </a:solidFill>
-                      <a:prstDash val="solid"/>
-                      <a:round/>
-                      <a:headEnd type="none" w="med" len="med"/>
-                      <a:tailEnd type="none" w="med" len="med"/>
-                    </a:lnT>
-                    <a:lnB w="3810" cap="flat" cmpd="sng" algn="ctr">
-                      <a:solidFill>
-                        <a:srgbClr val="D5D5D5"/>
-                      </a:solidFill>
-                      <a:prstDash val="solid"/>
-                      <a:round/>
-                      <a:headEnd type="none" w="med" len="med"/>
-                      <a:tailEnd type="none" w="med" len="med"/>
-                    </a:lnB>
-                    <a:solidFill>
-                      <a:srgbClr val="FFFFFF"/>
-                    </a:solidFill>
-                  </a:tcPr>
-                </a:tc>
-                <a:tc>
-                  <a:txBody>
-                    <a:bodyPr/>
-                    <a:lstStyle/>
-                    <a:p>
-                      <a:pPr algn="l" fontAlgn="t"/>
-                      <a:r>
-                        <a:rPr lang="en-US" sz="600">
-                          <a:effectLst/>
-                        </a:rPr>
-                        <a:t>Recommended chart type</a:t>
-                      </a:r>
-                    </a:p>
-                  </a:txBody>
-                  <a:tcPr marL="12232" marR="12232" marT="12232" marB="12232">
-                    <a:lnL w="3810" cap="flat" cmpd="sng" algn="ctr">
-                      <a:solidFill>
-                        <a:srgbClr val="D5D5D5"/>
-                      </a:solidFill>
-                      <a:prstDash val="solid"/>
-                      <a:round/>
-                      <a:headEnd type="none" w="med" len="med"/>
-                      <a:tailEnd type="none" w="med" len="med"/>
-                    </a:lnL>
-                    <a:lnR w="3810" cap="flat" cmpd="sng" algn="ctr">
-                      <a:solidFill>
-                        <a:srgbClr val="D5D5D5"/>
-                      </a:solidFill>
-                      <a:prstDash val="solid"/>
-                      <a:round/>
-                      <a:headEnd type="none" w="med" len="med"/>
-                      <a:tailEnd type="none" w="med" len="med"/>
-                    </a:lnR>
-                    <a:lnT w="3810" cap="flat" cmpd="sng" algn="ctr">
-                      <a:solidFill>
-                        <a:srgbClr val="D5D5D5"/>
-                      </a:solidFill>
-                      <a:prstDash val="solid"/>
-                      <a:round/>
-                      <a:headEnd type="none" w="med" len="med"/>
-                      <a:tailEnd type="none" w="med" len="med"/>
-                    </a:lnT>
-                    <a:lnB w="3810" cap="flat" cmpd="sng" algn="ctr">
-                      <a:solidFill>
-                        <a:srgbClr val="D5D5D5"/>
-                      </a:solidFill>
-                      <a:prstDash val="solid"/>
-                      <a:round/>
-                      <a:headEnd type="none" w="med" len="med"/>
-                      <a:tailEnd type="none" w="med" len="med"/>
-                    </a:lnB>
-                    <a:solidFill>
-                      <a:srgbClr val="FFFFFF"/>
-                    </a:solidFill>
-                  </a:tcPr>
-                </a:tc>
-                <a:extLst>
-                  <a:ext uri="{0D108BD9-81ED-4DB2-BD59-A6C34878D82A}">
-                    <a16:rowId xmlns:a16="http://schemas.microsoft.com/office/drawing/2014/main" val="1013494381"/>
-                  </a:ext>
-                </a:extLst>
-              </a:tr>
-              <a:tr h="220182">
-                <a:tc>
-                  <a:txBody>
-                    <a:bodyPr/>
-                    <a:lstStyle/>
-                    <a:p>
-                      <a:pPr algn="l" fontAlgn="t"/>
-                      <a:r>
-                        <a:rPr lang="en-US" sz="600">
-                          <a:effectLst/>
-                        </a:rPr>
-                        <a:t>Compare data side by side</a:t>
-                      </a:r>
-                    </a:p>
-                  </a:txBody>
-                  <a:tcPr marL="12232" marR="12232" marT="12232" marB="12232">
-                    <a:lnL w="3810" cap="flat" cmpd="sng" algn="ctr">
-                      <a:solidFill>
-                        <a:srgbClr val="D5D5D5"/>
-                      </a:solidFill>
-                      <a:prstDash val="solid"/>
-                      <a:round/>
-                      <a:headEnd type="none" w="med" len="med"/>
-                      <a:tailEnd type="none" w="med" len="med"/>
-                    </a:lnL>
-                    <a:lnR w="3810" cap="flat" cmpd="sng" algn="ctr">
-                      <a:solidFill>
-                        <a:srgbClr val="D5D5D5"/>
-                      </a:solidFill>
-                      <a:prstDash val="solid"/>
-                      <a:round/>
-                      <a:headEnd type="none" w="med" len="med"/>
-                      <a:tailEnd type="none" w="med" len="med"/>
-                    </a:lnR>
-                    <a:lnT w="3810" cap="flat" cmpd="sng" algn="ctr">
-                      <a:solidFill>
-                        <a:srgbClr val="D5D5D5"/>
-                      </a:solidFill>
-                      <a:prstDash val="solid"/>
-                      <a:round/>
-                      <a:headEnd type="none" w="med" len="med"/>
-                      <a:tailEnd type="none" w="med" len="med"/>
-                    </a:lnT>
-                    <a:lnB w="3810" cap="flat" cmpd="sng" algn="ctr">
-                      <a:solidFill>
-                        <a:srgbClr val="D5D5D5"/>
-                      </a:solidFill>
-                      <a:prstDash val="solid"/>
-                      <a:round/>
-                      <a:headEnd type="none" w="med" len="med"/>
-                      <a:tailEnd type="none" w="med" len="med"/>
-                    </a:lnB>
-                    <a:solidFill>
-                      <a:srgbClr val="FFFFFF"/>
-                    </a:solidFill>
-                  </a:tcPr>
-                </a:tc>
-                <a:tc>
-                  <a:txBody>
-                    <a:bodyPr/>
-                    <a:lstStyle/>
-                    <a:p>
-                      <a:pPr algn="l" fontAlgn="t"/>
-                      <a:r>
-                        <a:rPr lang="en-US" sz="600" i="0" u="none" strike="noStrike">
-                          <a:solidFill>
-                            <a:srgbClr val="007FCA"/>
-                          </a:solidFill>
-                          <a:effectLst/>
-                          <a:hlinkClick r:id="rId6"/>
-                        </a:rPr>
-                        <a:t>Bar chart</a:t>
-                      </a:r>
-                      <a:endParaRPr lang="en-US" sz="600">
-                        <a:effectLst/>
-                      </a:endParaRPr>
-                    </a:p>
-                  </a:txBody>
-                  <a:tcPr marL="12232" marR="12232" marT="12232" marB="12232">
-                    <a:lnL w="3810" cap="flat" cmpd="sng" algn="ctr">
-                      <a:solidFill>
-                        <a:srgbClr val="D5D5D5"/>
-                      </a:solidFill>
-                      <a:prstDash val="solid"/>
-                      <a:round/>
-                      <a:headEnd type="none" w="med" len="med"/>
-                      <a:tailEnd type="none" w="med" len="med"/>
-                    </a:lnL>
-                    <a:lnR w="3810" cap="flat" cmpd="sng" algn="ctr">
-                      <a:solidFill>
-                        <a:srgbClr val="D5D5D5"/>
-                      </a:solidFill>
-                      <a:prstDash val="solid"/>
-                      <a:round/>
-                      <a:headEnd type="none" w="med" len="med"/>
-                      <a:tailEnd type="none" w="med" len="med"/>
-                    </a:lnR>
-                    <a:lnT w="3810" cap="flat" cmpd="sng" algn="ctr">
-                      <a:solidFill>
-                        <a:srgbClr val="D5D5D5"/>
-                      </a:solidFill>
-                      <a:prstDash val="solid"/>
-                      <a:round/>
-                      <a:headEnd type="none" w="med" len="med"/>
-                      <a:tailEnd type="none" w="med" len="med"/>
-                    </a:lnT>
-                    <a:lnB w="3810" cap="flat" cmpd="sng" algn="ctr">
-                      <a:solidFill>
-                        <a:srgbClr val="D5D5D5"/>
-                      </a:solidFill>
-                      <a:prstDash val="solid"/>
-                      <a:round/>
-                      <a:headEnd type="none" w="med" len="med"/>
-                      <a:tailEnd type="none" w="med" len="med"/>
-                    </a:lnB>
-                    <a:solidFill>
-                      <a:srgbClr val="FFFFFF"/>
-                    </a:solidFill>
-                  </a:tcPr>
-                </a:tc>
-                <a:extLst>
-                  <a:ext uri="{0D108BD9-81ED-4DB2-BD59-A6C34878D82A}">
-                    <a16:rowId xmlns:a16="http://schemas.microsoft.com/office/drawing/2014/main" val="436628702"/>
-                  </a:ext>
-                </a:extLst>
-              </a:tr>
-              <a:tr h="220182">
-                <a:tc>
-                  <a:txBody>
-                    <a:bodyPr/>
-                    <a:lstStyle/>
-                    <a:p>
-                      <a:pPr algn="l" fontAlgn="t"/>
-                      <a:r>
-                        <a:rPr lang="en-US" sz="600">
-                          <a:effectLst/>
-                        </a:rPr>
-                        <a:t>Combine absolute and relative values</a:t>
-                      </a:r>
-                    </a:p>
-                  </a:txBody>
-                  <a:tcPr marL="12232" marR="12232" marT="12232" marB="12232">
-                    <a:lnL w="3810" cap="flat" cmpd="sng" algn="ctr">
-                      <a:solidFill>
-                        <a:srgbClr val="D5D5D5"/>
-                      </a:solidFill>
-                      <a:prstDash val="solid"/>
-                      <a:round/>
-                      <a:headEnd type="none" w="med" len="med"/>
-                      <a:tailEnd type="none" w="med" len="med"/>
-                    </a:lnL>
-                    <a:lnR w="3810" cap="flat" cmpd="sng" algn="ctr">
-                      <a:solidFill>
-                        <a:srgbClr val="D5D5D5"/>
-                      </a:solidFill>
-                      <a:prstDash val="solid"/>
-                      <a:round/>
-                      <a:headEnd type="none" w="med" len="med"/>
-                      <a:tailEnd type="none" w="med" len="med"/>
-                    </a:lnR>
-                    <a:lnT w="3810" cap="flat" cmpd="sng" algn="ctr">
-                      <a:solidFill>
-                        <a:srgbClr val="D5D5D5"/>
-                      </a:solidFill>
-                      <a:prstDash val="solid"/>
-                      <a:round/>
-                      <a:headEnd type="none" w="med" len="med"/>
-                      <a:tailEnd type="none" w="med" len="med"/>
-                    </a:lnT>
-                    <a:lnB w="3810" cap="flat" cmpd="sng" algn="ctr">
-                      <a:solidFill>
-                        <a:srgbClr val="D5D5D5"/>
-                      </a:solidFill>
-                      <a:prstDash val="solid"/>
-                      <a:round/>
-                      <a:headEnd type="none" w="med" len="med"/>
-                      <a:tailEnd type="none" w="med" len="med"/>
-                    </a:lnB>
-                    <a:solidFill>
-                      <a:srgbClr val="FFFFFF"/>
-                    </a:solidFill>
-                  </a:tcPr>
-                </a:tc>
-                <a:tc>
-                  <a:txBody>
-                    <a:bodyPr/>
-                    <a:lstStyle/>
-                    <a:p>
-                      <a:pPr algn="l" fontAlgn="t"/>
-                      <a:r>
-                        <a:rPr lang="en-US" sz="600" i="0" u="none" strike="noStrike">
-                          <a:solidFill>
-                            <a:srgbClr val="007FCA"/>
-                          </a:solidFill>
-                          <a:effectLst/>
-                          <a:hlinkClick r:id="rId7"/>
-                        </a:rPr>
-                        <a:t>Combo chart</a:t>
-                      </a:r>
-                      <a:endParaRPr lang="en-US" sz="600">
-                        <a:effectLst/>
-                      </a:endParaRPr>
-                    </a:p>
-                  </a:txBody>
-                  <a:tcPr marL="12232" marR="12232" marT="12232" marB="12232">
-                    <a:lnL w="3810" cap="flat" cmpd="sng" algn="ctr">
-                      <a:solidFill>
-                        <a:srgbClr val="D5D5D5"/>
-                      </a:solidFill>
-                      <a:prstDash val="solid"/>
-                      <a:round/>
-                      <a:headEnd type="none" w="med" len="med"/>
-                      <a:tailEnd type="none" w="med" len="med"/>
-                    </a:lnL>
-                    <a:lnR w="3810" cap="flat" cmpd="sng" algn="ctr">
-                      <a:solidFill>
-                        <a:srgbClr val="D5D5D5"/>
-                      </a:solidFill>
-                      <a:prstDash val="solid"/>
-                      <a:round/>
-                      <a:headEnd type="none" w="med" len="med"/>
-                      <a:tailEnd type="none" w="med" len="med"/>
-                    </a:lnR>
-                    <a:lnT w="3810" cap="flat" cmpd="sng" algn="ctr">
-                      <a:solidFill>
-                        <a:srgbClr val="D5D5D5"/>
-                      </a:solidFill>
-                      <a:prstDash val="solid"/>
-                      <a:round/>
-                      <a:headEnd type="none" w="med" len="med"/>
-                      <a:tailEnd type="none" w="med" len="med"/>
-                    </a:lnT>
-                    <a:lnB w="3810" cap="flat" cmpd="sng" algn="ctr">
-                      <a:solidFill>
-                        <a:srgbClr val="D5D5D5"/>
-                      </a:solidFill>
-                      <a:prstDash val="solid"/>
-                      <a:round/>
-                      <a:headEnd type="none" w="med" len="med"/>
-                      <a:tailEnd type="none" w="med" len="med"/>
-                    </a:lnB>
-                    <a:solidFill>
-                      <a:srgbClr val="FFFFFF"/>
-                    </a:solidFill>
-                  </a:tcPr>
-                </a:tc>
-                <a:extLst>
-                  <a:ext uri="{0D108BD9-81ED-4DB2-BD59-A6C34878D82A}">
-                    <a16:rowId xmlns:a16="http://schemas.microsoft.com/office/drawing/2014/main" val="3269853503"/>
-                  </a:ext>
-                </a:extLst>
-              </a:tr>
-              <a:tr h="220182">
-                <a:tc>
-                  <a:txBody>
-                    <a:bodyPr/>
-                    <a:lstStyle/>
-                    <a:p>
-                      <a:pPr algn="l" fontAlgn="t"/>
-                      <a:r>
-                        <a:rPr lang="en-US" sz="600">
-                          <a:effectLst/>
-                        </a:rPr>
-                        <a:t>Make selections to reduce data set</a:t>
-                      </a:r>
-                    </a:p>
-                  </a:txBody>
-                  <a:tcPr marL="12232" marR="12232" marT="12232" marB="12232">
-                    <a:lnL w="3810" cap="flat" cmpd="sng" algn="ctr">
-                      <a:solidFill>
-                        <a:srgbClr val="D5D5D5"/>
-                      </a:solidFill>
-                      <a:prstDash val="solid"/>
-                      <a:round/>
-                      <a:headEnd type="none" w="med" len="med"/>
-                      <a:tailEnd type="none" w="med" len="med"/>
-                    </a:lnL>
-                    <a:lnR w="3810" cap="flat" cmpd="sng" algn="ctr">
-                      <a:solidFill>
-                        <a:srgbClr val="D5D5D5"/>
-                      </a:solidFill>
-                      <a:prstDash val="solid"/>
-                      <a:round/>
-                      <a:headEnd type="none" w="med" len="med"/>
-                      <a:tailEnd type="none" w="med" len="med"/>
-                    </a:lnR>
-                    <a:lnT w="3810" cap="flat" cmpd="sng" algn="ctr">
-                      <a:solidFill>
-                        <a:srgbClr val="D5D5D5"/>
-                      </a:solidFill>
-                      <a:prstDash val="solid"/>
-                      <a:round/>
-                      <a:headEnd type="none" w="med" len="med"/>
-                      <a:tailEnd type="none" w="med" len="med"/>
-                    </a:lnT>
-                    <a:lnB w="3810" cap="flat" cmpd="sng" algn="ctr">
-                      <a:solidFill>
-                        <a:srgbClr val="D5D5D5"/>
-                      </a:solidFill>
-                      <a:prstDash val="solid"/>
-                      <a:round/>
-                      <a:headEnd type="none" w="med" len="med"/>
-                      <a:tailEnd type="none" w="med" len="med"/>
-                    </a:lnB>
-                    <a:solidFill>
-                      <a:srgbClr val="FFFFFF"/>
-                    </a:solidFill>
-                  </a:tcPr>
-                </a:tc>
-                <a:tc>
-                  <a:txBody>
-                    <a:bodyPr/>
-                    <a:lstStyle/>
-                    <a:p>
-                      <a:pPr algn="l" fontAlgn="t"/>
-                      <a:r>
-                        <a:rPr lang="en-US" sz="600" i="0" u="none" strike="noStrike">
-                          <a:solidFill>
-                            <a:srgbClr val="007FCA"/>
-                          </a:solidFill>
-                          <a:effectLst/>
-                          <a:hlinkClick r:id="rId8"/>
-                        </a:rPr>
-                        <a:t>Filter pane</a:t>
-                      </a:r>
-                      <a:endParaRPr lang="en-US" sz="600">
-                        <a:effectLst/>
-                      </a:endParaRPr>
-                    </a:p>
-                  </a:txBody>
-                  <a:tcPr marL="12232" marR="12232" marT="12232" marB="12232">
-                    <a:lnL w="3810" cap="flat" cmpd="sng" algn="ctr">
-                      <a:solidFill>
-                        <a:srgbClr val="D5D5D5"/>
-                      </a:solidFill>
-                      <a:prstDash val="solid"/>
-                      <a:round/>
-                      <a:headEnd type="none" w="med" len="med"/>
-                      <a:tailEnd type="none" w="med" len="med"/>
-                    </a:lnL>
-                    <a:lnR w="3810" cap="flat" cmpd="sng" algn="ctr">
-                      <a:solidFill>
-                        <a:srgbClr val="D5D5D5"/>
-                      </a:solidFill>
-                      <a:prstDash val="solid"/>
-                      <a:round/>
-                      <a:headEnd type="none" w="med" len="med"/>
-                      <a:tailEnd type="none" w="med" len="med"/>
-                    </a:lnR>
-                    <a:lnT w="3810" cap="flat" cmpd="sng" algn="ctr">
-                      <a:solidFill>
-                        <a:srgbClr val="D5D5D5"/>
-                      </a:solidFill>
-                      <a:prstDash val="solid"/>
-                      <a:round/>
-                      <a:headEnd type="none" w="med" len="med"/>
-                      <a:tailEnd type="none" w="med" len="med"/>
-                    </a:lnT>
-                    <a:lnB w="3810" cap="flat" cmpd="sng" algn="ctr">
-                      <a:solidFill>
-                        <a:srgbClr val="D5D5D5"/>
-                      </a:solidFill>
-                      <a:prstDash val="solid"/>
-                      <a:round/>
-                      <a:headEnd type="none" w="med" len="med"/>
-                      <a:tailEnd type="none" w="med" len="med"/>
-                    </a:lnB>
-                    <a:solidFill>
-                      <a:srgbClr val="FFFFFF"/>
-                    </a:solidFill>
-                  </a:tcPr>
-                </a:tc>
-                <a:extLst>
-                  <a:ext uri="{0D108BD9-81ED-4DB2-BD59-A6C34878D82A}">
-                    <a16:rowId xmlns:a16="http://schemas.microsoft.com/office/drawing/2014/main" val="3352305644"/>
-                  </a:ext>
-                </a:extLst>
-              </a:tr>
-              <a:tr h="122323">
-                <a:tc>
-                  <a:txBody>
-                    <a:bodyPr/>
-                    <a:lstStyle/>
-                    <a:p>
-                      <a:pPr algn="l" fontAlgn="t"/>
-                      <a:r>
-                        <a:rPr lang="en-US" sz="600">
-                          <a:effectLst/>
-                        </a:rPr>
-                        <a:t>Indicate ratio</a:t>
-                      </a:r>
-                    </a:p>
-                  </a:txBody>
-                  <a:tcPr marL="12232" marR="12232" marT="12232" marB="12232">
-                    <a:lnL w="3810" cap="flat" cmpd="sng" algn="ctr">
-                      <a:solidFill>
-                        <a:srgbClr val="D5D5D5"/>
-                      </a:solidFill>
-                      <a:prstDash val="solid"/>
-                      <a:round/>
-                      <a:headEnd type="none" w="med" len="med"/>
-                      <a:tailEnd type="none" w="med" len="med"/>
-                    </a:lnL>
-                    <a:lnR w="3810" cap="flat" cmpd="sng" algn="ctr">
-                      <a:solidFill>
-                        <a:srgbClr val="D5D5D5"/>
-                      </a:solidFill>
-                      <a:prstDash val="solid"/>
-                      <a:round/>
-                      <a:headEnd type="none" w="med" len="med"/>
-                      <a:tailEnd type="none" w="med" len="med"/>
-                    </a:lnR>
-                    <a:lnT w="3810" cap="flat" cmpd="sng" algn="ctr">
-                      <a:solidFill>
-                        <a:srgbClr val="D5D5D5"/>
-                      </a:solidFill>
-                      <a:prstDash val="solid"/>
-                      <a:round/>
-                      <a:headEnd type="none" w="med" len="med"/>
-                      <a:tailEnd type="none" w="med" len="med"/>
-                    </a:lnT>
-                    <a:lnB w="3810" cap="flat" cmpd="sng" algn="ctr">
-                      <a:solidFill>
-                        <a:srgbClr val="D5D5D5"/>
-                      </a:solidFill>
-                      <a:prstDash val="solid"/>
-                      <a:round/>
-                      <a:headEnd type="none" w="med" len="med"/>
-                      <a:tailEnd type="none" w="med" len="med"/>
-                    </a:lnB>
-                    <a:solidFill>
-                      <a:srgbClr val="FFFFFF"/>
-                    </a:solidFill>
-                  </a:tcPr>
-                </a:tc>
-                <a:tc>
-                  <a:txBody>
-                    <a:bodyPr/>
-                    <a:lstStyle/>
-                    <a:p>
-                      <a:pPr algn="l" fontAlgn="t"/>
-                      <a:r>
-                        <a:rPr lang="en-US" sz="600" i="0" u="none" strike="noStrike">
-                          <a:solidFill>
-                            <a:srgbClr val="007FCA"/>
-                          </a:solidFill>
-                          <a:effectLst/>
-                          <a:hlinkClick r:id="rId9"/>
-                        </a:rPr>
-                        <a:t>Gauge</a:t>
-                      </a:r>
-                      <a:endParaRPr lang="en-US" sz="600">
-                        <a:effectLst/>
-                      </a:endParaRPr>
-                    </a:p>
-                  </a:txBody>
-                  <a:tcPr marL="12232" marR="12232" marT="12232" marB="12232">
-                    <a:lnL w="3810" cap="flat" cmpd="sng" algn="ctr">
-                      <a:solidFill>
-                        <a:srgbClr val="D5D5D5"/>
-                      </a:solidFill>
-                      <a:prstDash val="solid"/>
-                      <a:round/>
-                      <a:headEnd type="none" w="med" len="med"/>
-                      <a:tailEnd type="none" w="med" len="med"/>
-                    </a:lnL>
-                    <a:lnR w="3810" cap="flat" cmpd="sng" algn="ctr">
-                      <a:solidFill>
-                        <a:srgbClr val="D5D5D5"/>
-                      </a:solidFill>
-                      <a:prstDash val="solid"/>
-                      <a:round/>
-                      <a:headEnd type="none" w="med" len="med"/>
-                      <a:tailEnd type="none" w="med" len="med"/>
-                    </a:lnR>
-                    <a:lnT w="3810" cap="flat" cmpd="sng" algn="ctr">
-                      <a:solidFill>
-                        <a:srgbClr val="D5D5D5"/>
-                      </a:solidFill>
-                      <a:prstDash val="solid"/>
-                      <a:round/>
-                      <a:headEnd type="none" w="med" len="med"/>
-                      <a:tailEnd type="none" w="med" len="med"/>
-                    </a:lnT>
-                    <a:lnB w="3810" cap="flat" cmpd="sng" algn="ctr">
-                      <a:solidFill>
-                        <a:srgbClr val="D5D5D5"/>
-                      </a:solidFill>
-                      <a:prstDash val="solid"/>
-                      <a:round/>
-                      <a:headEnd type="none" w="med" len="med"/>
-                      <a:tailEnd type="none" w="med" len="med"/>
-                    </a:lnB>
-                    <a:solidFill>
-                      <a:srgbClr val="FFFFFF"/>
-                    </a:solidFill>
-                  </a:tcPr>
-                </a:tc>
-                <a:extLst>
-                  <a:ext uri="{0D108BD9-81ED-4DB2-BD59-A6C34878D82A}">
-                    <a16:rowId xmlns:a16="http://schemas.microsoft.com/office/drawing/2014/main" val="2021686550"/>
-                  </a:ext>
-                </a:extLst>
-              </a:tr>
-              <a:tr h="220182">
-                <a:tc>
-                  <a:txBody>
-                    <a:bodyPr/>
-                    <a:lstStyle/>
-                    <a:p>
-                      <a:pPr algn="l" fontAlgn="t"/>
-                      <a:r>
-                        <a:rPr lang="en-US" sz="600">
-                          <a:effectLst/>
-                        </a:rPr>
-                        <a:t>Display a performance value</a:t>
-                      </a:r>
-                    </a:p>
-                  </a:txBody>
-                  <a:tcPr marL="12232" marR="12232" marT="12232" marB="12232">
-                    <a:lnL w="3810" cap="flat" cmpd="sng" algn="ctr">
-                      <a:solidFill>
-                        <a:srgbClr val="D5D5D5"/>
-                      </a:solidFill>
-                      <a:prstDash val="solid"/>
-                      <a:round/>
-                      <a:headEnd type="none" w="med" len="med"/>
-                      <a:tailEnd type="none" w="med" len="med"/>
-                    </a:lnL>
-                    <a:lnR w="3810" cap="flat" cmpd="sng" algn="ctr">
-                      <a:solidFill>
-                        <a:srgbClr val="D5D5D5"/>
-                      </a:solidFill>
-                      <a:prstDash val="solid"/>
-                      <a:round/>
-                      <a:headEnd type="none" w="med" len="med"/>
-                      <a:tailEnd type="none" w="med" len="med"/>
-                    </a:lnR>
-                    <a:lnT w="3810" cap="flat" cmpd="sng" algn="ctr">
-                      <a:solidFill>
-                        <a:srgbClr val="D5D5D5"/>
-                      </a:solidFill>
-                      <a:prstDash val="solid"/>
-                      <a:round/>
-                      <a:headEnd type="none" w="med" len="med"/>
-                      <a:tailEnd type="none" w="med" len="med"/>
-                    </a:lnT>
-                    <a:lnB w="3810" cap="flat" cmpd="sng" algn="ctr">
-                      <a:solidFill>
-                        <a:srgbClr val="D5D5D5"/>
-                      </a:solidFill>
-                      <a:prstDash val="solid"/>
-                      <a:round/>
-                      <a:headEnd type="none" w="med" len="med"/>
-                      <a:tailEnd type="none" w="med" len="med"/>
-                    </a:lnB>
-                    <a:solidFill>
-                      <a:srgbClr val="FFFFFF"/>
-                    </a:solidFill>
-                  </a:tcPr>
-                </a:tc>
-                <a:tc>
-                  <a:txBody>
-                    <a:bodyPr/>
-                    <a:lstStyle/>
-                    <a:p>
-                      <a:pPr algn="l" fontAlgn="t"/>
-                      <a:r>
-                        <a:rPr lang="en-US" sz="600" i="0" u="none" strike="noStrike">
-                          <a:solidFill>
-                            <a:srgbClr val="007FCA"/>
-                          </a:solidFill>
-                          <a:effectLst/>
-                          <a:hlinkClick r:id="rId10"/>
-                        </a:rPr>
-                        <a:t>KPI</a:t>
-                      </a:r>
-                      <a:endParaRPr lang="en-US" sz="600">
-                        <a:effectLst/>
-                      </a:endParaRPr>
-                    </a:p>
-                  </a:txBody>
-                  <a:tcPr marL="12232" marR="12232" marT="12232" marB="12232">
-                    <a:lnL w="3810" cap="flat" cmpd="sng" algn="ctr">
-                      <a:solidFill>
-                        <a:srgbClr val="D5D5D5"/>
-                      </a:solidFill>
-                      <a:prstDash val="solid"/>
-                      <a:round/>
-                      <a:headEnd type="none" w="med" len="med"/>
-                      <a:tailEnd type="none" w="med" len="med"/>
-                    </a:lnL>
-                    <a:lnR w="3810" cap="flat" cmpd="sng" algn="ctr">
-                      <a:solidFill>
-                        <a:srgbClr val="D5D5D5"/>
-                      </a:solidFill>
-                      <a:prstDash val="solid"/>
-                      <a:round/>
-                      <a:headEnd type="none" w="med" len="med"/>
-                      <a:tailEnd type="none" w="med" len="med"/>
-                    </a:lnR>
-                    <a:lnT w="3810" cap="flat" cmpd="sng" algn="ctr">
-                      <a:solidFill>
-                        <a:srgbClr val="D5D5D5"/>
-                      </a:solidFill>
-                      <a:prstDash val="solid"/>
-                      <a:round/>
-                      <a:headEnd type="none" w="med" len="med"/>
-                      <a:tailEnd type="none" w="med" len="med"/>
-                    </a:lnT>
-                    <a:lnB w="3810" cap="flat" cmpd="sng" algn="ctr">
-                      <a:solidFill>
-                        <a:srgbClr val="D5D5D5"/>
-                      </a:solidFill>
-                      <a:prstDash val="solid"/>
-                      <a:round/>
-                      <a:headEnd type="none" w="med" len="med"/>
-                      <a:tailEnd type="none" w="med" len="med"/>
-                    </a:lnB>
-                    <a:solidFill>
-                      <a:srgbClr val="FFFFFF"/>
-                    </a:solidFill>
-                  </a:tcPr>
-                </a:tc>
-                <a:extLst>
-                  <a:ext uri="{0D108BD9-81ED-4DB2-BD59-A6C34878D82A}">
-                    <a16:rowId xmlns:a16="http://schemas.microsoft.com/office/drawing/2014/main" val="1227876739"/>
-                  </a:ext>
-                </a:extLst>
-              </a:tr>
-              <a:tr h="220182">
-                <a:tc>
-                  <a:txBody>
-                    <a:bodyPr/>
-                    <a:lstStyle/>
-                    <a:p>
-                      <a:pPr algn="l" fontAlgn="t"/>
-                      <a:r>
-                        <a:rPr lang="en-US" sz="600">
-                          <a:effectLst/>
-                        </a:rPr>
-                        <a:t>Display trends over time</a:t>
-                      </a:r>
-                    </a:p>
-                  </a:txBody>
-                  <a:tcPr marL="12232" marR="12232" marT="12232" marB="12232">
-                    <a:lnL w="3810" cap="flat" cmpd="sng" algn="ctr">
-                      <a:solidFill>
-                        <a:srgbClr val="D5D5D5"/>
-                      </a:solidFill>
-                      <a:prstDash val="solid"/>
-                      <a:round/>
-                      <a:headEnd type="none" w="med" len="med"/>
-                      <a:tailEnd type="none" w="med" len="med"/>
-                    </a:lnL>
-                    <a:lnR w="3810" cap="flat" cmpd="sng" algn="ctr">
-                      <a:solidFill>
-                        <a:srgbClr val="D5D5D5"/>
-                      </a:solidFill>
-                      <a:prstDash val="solid"/>
-                      <a:round/>
-                      <a:headEnd type="none" w="med" len="med"/>
-                      <a:tailEnd type="none" w="med" len="med"/>
-                    </a:lnR>
-                    <a:lnT w="3810" cap="flat" cmpd="sng" algn="ctr">
-                      <a:solidFill>
-                        <a:srgbClr val="D5D5D5"/>
-                      </a:solidFill>
-                      <a:prstDash val="solid"/>
-                      <a:round/>
-                      <a:headEnd type="none" w="med" len="med"/>
-                      <a:tailEnd type="none" w="med" len="med"/>
-                    </a:lnT>
-                    <a:lnB w="3810" cap="flat" cmpd="sng" algn="ctr">
-                      <a:solidFill>
-                        <a:srgbClr val="D5D5D5"/>
-                      </a:solidFill>
-                      <a:prstDash val="solid"/>
-                      <a:round/>
-                      <a:headEnd type="none" w="med" len="med"/>
-                      <a:tailEnd type="none" w="med" len="med"/>
-                    </a:lnB>
-                    <a:solidFill>
-                      <a:srgbClr val="FFFFFF"/>
-                    </a:solidFill>
-                  </a:tcPr>
-                </a:tc>
-                <a:tc>
-                  <a:txBody>
-                    <a:bodyPr/>
-                    <a:lstStyle/>
-                    <a:p>
-                      <a:pPr algn="l" fontAlgn="t"/>
-                      <a:r>
-                        <a:rPr lang="en-US" sz="600" i="0" u="none" strike="noStrike">
-                          <a:solidFill>
-                            <a:srgbClr val="007FCA"/>
-                          </a:solidFill>
-                          <a:effectLst/>
-                          <a:hlinkClick r:id="rId11"/>
-                        </a:rPr>
-                        <a:t>Line chart</a:t>
-                      </a:r>
-                      <a:endParaRPr lang="en-US" sz="600">
-                        <a:effectLst/>
-                      </a:endParaRPr>
-                    </a:p>
-                  </a:txBody>
-                  <a:tcPr marL="12232" marR="12232" marT="12232" marB="12232">
-                    <a:lnL w="3810" cap="flat" cmpd="sng" algn="ctr">
-                      <a:solidFill>
-                        <a:srgbClr val="D5D5D5"/>
-                      </a:solidFill>
-                      <a:prstDash val="solid"/>
-                      <a:round/>
-                      <a:headEnd type="none" w="med" len="med"/>
-                      <a:tailEnd type="none" w="med" len="med"/>
-                    </a:lnL>
-                    <a:lnR w="3810" cap="flat" cmpd="sng" algn="ctr">
-                      <a:solidFill>
-                        <a:srgbClr val="D5D5D5"/>
-                      </a:solidFill>
-                      <a:prstDash val="solid"/>
-                      <a:round/>
-                      <a:headEnd type="none" w="med" len="med"/>
-                      <a:tailEnd type="none" w="med" len="med"/>
-                    </a:lnR>
-                    <a:lnT w="3810" cap="flat" cmpd="sng" algn="ctr">
-                      <a:solidFill>
-                        <a:srgbClr val="D5D5D5"/>
-                      </a:solidFill>
-                      <a:prstDash val="solid"/>
-                      <a:round/>
-                      <a:headEnd type="none" w="med" len="med"/>
-                      <a:tailEnd type="none" w="med" len="med"/>
-                    </a:lnT>
-                    <a:lnB w="3810" cap="flat" cmpd="sng" algn="ctr">
-                      <a:solidFill>
-                        <a:srgbClr val="D5D5D5"/>
-                      </a:solidFill>
-                      <a:prstDash val="solid"/>
-                      <a:round/>
-                      <a:headEnd type="none" w="med" len="med"/>
-                      <a:tailEnd type="none" w="med" len="med"/>
-                    </a:lnB>
-                    <a:solidFill>
-                      <a:srgbClr val="FFFFFF"/>
-                    </a:solidFill>
-                  </a:tcPr>
-                </a:tc>
-                <a:extLst>
-                  <a:ext uri="{0D108BD9-81ED-4DB2-BD59-A6C34878D82A}">
-                    <a16:rowId xmlns:a16="http://schemas.microsoft.com/office/drawing/2014/main" val="3783589215"/>
-                  </a:ext>
-                </a:extLst>
-              </a:tr>
-              <a:tr h="220182">
-                <a:tc>
-                  <a:txBody>
-                    <a:bodyPr/>
-                    <a:lstStyle/>
-                    <a:p>
-                      <a:pPr algn="l" fontAlgn="t"/>
-                      <a:r>
-                        <a:rPr lang="en-US" sz="600">
-                          <a:effectLst/>
-                        </a:rPr>
-                        <a:t>Display point and area data</a:t>
-                      </a:r>
-                    </a:p>
-                  </a:txBody>
-                  <a:tcPr marL="12232" marR="12232" marT="12232" marB="12232">
-                    <a:lnL w="3810" cap="flat" cmpd="sng" algn="ctr">
-                      <a:solidFill>
-                        <a:srgbClr val="D5D5D5"/>
-                      </a:solidFill>
-                      <a:prstDash val="solid"/>
-                      <a:round/>
-                      <a:headEnd type="none" w="med" len="med"/>
-                      <a:tailEnd type="none" w="med" len="med"/>
-                    </a:lnL>
-                    <a:lnR w="3810" cap="flat" cmpd="sng" algn="ctr">
-                      <a:solidFill>
-                        <a:srgbClr val="D5D5D5"/>
-                      </a:solidFill>
-                      <a:prstDash val="solid"/>
-                      <a:round/>
-                      <a:headEnd type="none" w="med" len="med"/>
-                      <a:tailEnd type="none" w="med" len="med"/>
-                    </a:lnR>
-                    <a:lnT w="3810" cap="flat" cmpd="sng" algn="ctr">
-                      <a:solidFill>
-                        <a:srgbClr val="D5D5D5"/>
-                      </a:solidFill>
-                      <a:prstDash val="solid"/>
-                      <a:round/>
-                      <a:headEnd type="none" w="med" len="med"/>
-                      <a:tailEnd type="none" w="med" len="med"/>
-                    </a:lnT>
-                    <a:lnB w="3810" cap="flat" cmpd="sng" algn="ctr">
-                      <a:solidFill>
-                        <a:srgbClr val="D5D5D5"/>
-                      </a:solidFill>
-                      <a:prstDash val="solid"/>
-                      <a:round/>
-                      <a:headEnd type="none" w="med" len="med"/>
-                      <a:tailEnd type="none" w="med" len="med"/>
-                    </a:lnB>
-                    <a:solidFill>
-                      <a:srgbClr val="FFFFFF"/>
-                    </a:solidFill>
-                  </a:tcPr>
-                </a:tc>
-                <a:tc>
-                  <a:txBody>
-                    <a:bodyPr/>
-                    <a:lstStyle/>
-                    <a:p>
-                      <a:pPr algn="l" fontAlgn="t"/>
-                      <a:r>
-                        <a:rPr lang="en-US" sz="600" i="0" u="none" strike="noStrike">
-                          <a:solidFill>
-                            <a:srgbClr val="007FCA"/>
-                          </a:solidFill>
-                          <a:effectLst/>
-                          <a:hlinkClick r:id="rId12"/>
-                        </a:rPr>
-                        <a:t>Map</a:t>
-                      </a:r>
-                      <a:endParaRPr lang="en-US" sz="600">
-                        <a:effectLst/>
-                      </a:endParaRPr>
-                    </a:p>
-                  </a:txBody>
-                  <a:tcPr marL="12232" marR="12232" marT="12232" marB="12232">
-                    <a:lnL w="3810" cap="flat" cmpd="sng" algn="ctr">
-                      <a:solidFill>
-                        <a:srgbClr val="D5D5D5"/>
-                      </a:solidFill>
-                      <a:prstDash val="solid"/>
-                      <a:round/>
-                      <a:headEnd type="none" w="med" len="med"/>
-                      <a:tailEnd type="none" w="med" len="med"/>
-                    </a:lnL>
-                    <a:lnR w="3810" cap="flat" cmpd="sng" algn="ctr">
-                      <a:solidFill>
-                        <a:srgbClr val="D5D5D5"/>
-                      </a:solidFill>
-                      <a:prstDash val="solid"/>
-                      <a:round/>
-                      <a:headEnd type="none" w="med" len="med"/>
-                      <a:tailEnd type="none" w="med" len="med"/>
-                    </a:lnR>
-                    <a:lnT w="3810" cap="flat" cmpd="sng" algn="ctr">
-                      <a:solidFill>
-                        <a:srgbClr val="D5D5D5"/>
-                      </a:solidFill>
-                      <a:prstDash val="solid"/>
-                      <a:round/>
-                      <a:headEnd type="none" w="med" len="med"/>
-                      <a:tailEnd type="none" w="med" len="med"/>
-                    </a:lnT>
-                    <a:lnB w="3810" cap="flat" cmpd="sng" algn="ctr">
-                      <a:solidFill>
-                        <a:srgbClr val="D5D5D5"/>
-                      </a:solidFill>
-                      <a:prstDash val="solid"/>
-                      <a:round/>
-                      <a:headEnd type="none" w="med" len="med"/>
-                      <a:tailEnd type="none" w="med" len="med"/>
-                    </a:lnB>
-                    <a:solidFill>
-                      <a:srgbClr val="FFFFFF"/>
-                    </a:solidFill>
-                  </a:tcPr>
-                </a:tc>
-                <a:extLst>
-                  <a:ext uri="{0D108BD9-81ED-4DB2-BD59-A6C34878D82A}">
-                    <a16:rowId xmlns:a16="http://schemas.microsoft.com/office/drawing/2014/main" val="3933757286"/>
-                  </a:ext>
-                </a:extLst>
-              </a:tr>
-              <a:tr h="220182">
-                <a:tc>
-                  <a:txBody>
-                    <a:bodyPr/>
-                    <a:lstStyle/>
-                    <a:p>
-                      <a:pPr algn="l" fontAlgn="t"/>
-                      <a:r>
-                        <a:rPr lang="en-US" sz="600">
-                          <a:effectLst/>
-                        </a:rPr>
-                        <a:t>Display ratio to total</a:t>
-                      </a:r>
-                    </a:p>
-                  </a:txBody>
-                  <a:tcPr marL="12232" marR="12232" marT="12232" marB="12232">
-                    <a:lnL w="3810" cap="flat" cmpd="sng" algn="ctr">
-                      <a:solidFill>
-                        <a:srgbClr val="D5D5D5"/>
-                      </a:solidFill>
-                      <a:prstDash val="solid"/>
-                      <a:round/>
-                      <a:headEnd type="none" w="med" len="med"/>
-                      <a:tailEnd type="none" w="med" len="med"/>
-                    </a:lnL>
-                    <a:lnR w="3810" cap="flat" cmpd="sng" algn="ctr">
-                      <a:solidFill>
-                        <a:srgbClr val="D5D5D5"/>
-                      </a:solidFill>
-                      <a:prstDash val="solid"/>
-                      <a:round/>
-                      <a:headEnd type="none" w="med" len="med"/>
-                      <a:tailEnd type="none" w="med" len="med"/>
-                    </a:lnR>
-                    <a:lnT w="3810" cap="flat" cmpd="sng" algn="ctr">
-                      <a:solidFill>
-                        <a:srgbClr val="D5D5D5"/>
-                      </a:solidFill>
-                      <a:prstDash val="solid"/>
-                      <a:round/>
-                      <a:headEnd type="none" w="med" len="med"/>
-                      <a:tailEnd type="none" w="med" len="med"/>
-                    </a:lnT>
-                    <a:lnB w="3810" cap="flat" cmpd="sng" algn="ctr">
-                      <a:solidFill>
-                        <a:srgbClr val="D5D5D5"/>
-                      </a:solidFill>
-                      <a:prstDash val="solid"/>
-                      <a:round/>
-                      <a:headEnd type="none" w="med" len="med"/>
-                      <a:tailEnd type="none" w="med" len="med"/>
-                    </a:lnB>
-                    <a:solidFill>
-                      <a:srgbClr val="FFFFFF"/>
-                    </a:solidFill>
-                  </a:tcPr>
-                </a:tc>
-                <a:tc>
-                  <a:txBody>
-                    <a:bodyPr/>
-                    <a:lstStyle/>
-                    <a:p>
-                      <a:pPr algn="l" fontAlgn="t"/>
-                      <a:r>
-                        <a:rPr lang="en-US" sz="600" i="0" u="none" strike="noStrike">
-                          <a:solidFill>
-                            <a:srgbClr val="007FCA"/>
-                          </a:solidFill>
-                          <a:effectLst/>
-                          <a:hlinkClick r:id="rId13"/>
-                        </a:rPr>
-                        <a:t>Pie chart</a:t>
-                      </a:r>
-                      <a:endParaRPr lang="en-US" sz="600">
-                        <a:effectLst/>
-                      </a:endParaRPr>
-                    </a:p>
-                  </a:txBody>
-                  <a:tcPr marL="12232" marR="12232" marT="12232" marB="12232">
-                    <a:lnL w="3810" cap="flat" cmpd="sng" algn="ctr">
-                      <a:solidFill>
-                        <a:srgbClr val="D5D5D5"/>
-                      </a:solidFill>
-                      <a:prstDash val="solid"/>
-                      <a:round/>
-                      <a:headEnd type="none" w="med" len="med"/>
-                      <a:tailEnd type="none" w="med" len="med"/>
-                    </a:lnL>
-                    <a:lnR w="3810" cap="flat" cmpd="sng" algn="ctr">
-                      <a:solidFill>
-                        <a:srgbClr val="D5D5D5"/>
-                      </a:solidFill>
-                      <a:prstDash val="solid"/>
-                      <a:round/>
-                      <a:headEnd type="none" w="med" len="med"/>
-                      <a:tailEnd type="none" w="med" len="med"/>
-                    </a:lnR>
-                    <a:lnT w="3810" cap="flat" cmpd="sng" algn="ctr">
-                      <a:solidFill>
-                        <a:srgbClr val="D5D5D5"/>
-                      </a:solidFill>
-                      <a:prstDash val="solid"/>
-                      <a:round/>
-                      <a:headEnd type="none" w="med" len="med"/>
-                      <a:tailEnd type="none" w="med" len="med"/>
-                    </a:lnT>
-                    <a:lnB w="3810" cap="flat" cmpd="sng" algn="ctr">
-                      <a:solidFill>
-                        <a:srgbClr val="D5D5D5"/>
-                      </a:solidFill>
-                      <a:prstDash val="solid"/>
-                      <a:round/>
-                      <a:headEnd type="none" w="med" len="med"/>
-                      <a:tailEnd type="none" w="med" len="med"/>
-                    </a:lnB>
-                    <a:solidFill>
-                      <a:srgbClr val="FFFFFF"/>
-                    </a:solidFill>
-                  </a:tcPr>
-                </a:tc>
-                <a:extLst>
-                  <a:ext uri="{0D108BD9-81ED-4DB2-BD59-A6C34878D82A}">
-                    <a16:rowId xmlns:a16="http://schemas.microsoft.com/office/drawing/2014/main" val="2241657364"/>
-                  </a:ext>
-                </a:extLst>
-              </a:tr>
-              <a:tr h="415899">
-                <a:tc>
-                  <a:txBody>
-                    <a:bodyPr/>
-                    <a:lstStyle/>
-                    <a:p>
-                      <a:pPr algn="l" fontAlgn="t"/>
-                      <a:r>
-                        <a:rPr lang="en-US" sz="600">
-                          <a:effectLst/>
-                        </a:rPr>
-                        <a:t>Create a cross table view of data and to summarize data</a:t>
-                      </a:r>
-                    </a:p>
-                  </a:txBody>
-                  <a:tcPr marL="12232" marR="12232" marT="12232" marB="12232">
-                    <a:lnL w="3810" cap="flat" cmpd="sng" algn="ctr">
-                      <a:solidFill>
-                        <a:srgbClr val="D5D5D5"/>
-                      </a:solidFill>
-                      <a:prstDash val="solid"/>
-                      <a:round/>
-                      <a:headEnd type="none" w="med" len="med"/>
-                      <a:tailEnd type="none" w="med" len="med"/>
-                    </a:lnL>
-                    <a:lnR w="3810" cap="flat" cmpd="sng" algn="ctr">
-                      <a:solidFill>
-                        <a:srgbClr val="D5D5D5"/>
-                      </a:solidFill>
-                      <a:prstDash val="solid"/>
-                      <a:round/>
-                      <a:headEnd type="none" w="med" len="med"/>
-                      <a:tailEnd type="none" w="med" len="med"/>
-                    </a:lnR>
-                    <a:lnT w="3810" cap="flat" cmpd="sng" algn="ctr">
-                      <a:solidFill>
-                        <a:srgbClr val="D5D5D5"/>
-                      </a:solidFill>
-                      <a:prstDash val="solid"/>
-                      <a:round/>
-                      <a:headEnd type="none" w="med" len="med"/>
-                      <a:tailEnd type="none" w="med" len="med"/>
-                    </a:lnT>
-                    <a:lnB w="3810" cap="flat" cmpd="sng" algn="ctr">
-                      <a:solidFill>
-                        <a:srgbClr val="D5D5D5"/>
-                      </a:solidFill>
-                      <a:prstDash val="solid"/>
-                      <a:round/>
-                      <a:headEnd type="none" w="med" len="med"/>
-                      <a:tailEnd type="none" w="med" len="med"/>
-                    </a:lnB>
-                    <a:solidFill>
-                      <a:srgbClr val="FFFFFF"/>
-                    </a:solidFill>
-                  </a:tcPr>
-                </a:tc>
-                <a:tc>
-                  <a:txBody>
-                    <a:bodyPr/>
-                    <a:lstStyle/>
-                    <a:p>
-                      <a:pPr algn="l" fontAlgn="t"/>
-                      <a:r>
-                        <a:rPr lang="en-US" sz="600" i="0" u="none" strike="noStrike">
-                          <a:solidFill>
-                            <a:srgbClr val="007FCA"/>
-                          </a:solidFill>
-                          <a:effectLst/>
-                          <a:hlinkClick r:id="rId14"/>
-                        </a:rPr>
-                        <a:t>Pivot table</a:t>
-                      </a:r>
-                      <a:endParaRPr lang="en-US" sz="600">
-                        <a:effectLst/>
-                      </a:endParaRPr>
-                    </a:p>
-                  </a:txBody>
-                  <a:tcPr marL="12232" marR="12232" marT="12232" marB="12232">
-                    <a:lnL w="3810" cap="flat" cmpd="sng" algn="ctr">
-                      <a:solidFill>
-                        <a:srgbClr val="D5D5D5"/>
-                      </a:solidFill>
-                      <a:prstDash val="solid"/>
-                      <a:round/>
-                      <a:headEnd type="none" w="med" len="med"/>
-                      <a:tailEnd type="none" w="med" len="med"/>
-                    </a:lnL>
-                    <a:lnR w="3810" cap="flat" cmpd="sng" algn="ctr">
-                      <a:solidFill>
-                        <a:srgbClr val="D5D5D5"/>
-                      </a:solidFill>
-                      <a:prstDash val="solid"/>
-                      <a:round/>
-                      <a:headEnd type="none" w="med" len="med"/>
-                      <a:tailEnd type="none" w="med" len="med"/>
-                    </a:lnR>
-                    <a:lnT w="3810" cap="flat" cmpd="sng" algn="ctr">
-                      <a:solidFill>
-                        <a:srgbClr val="D5D5D5"/>
-                      </a:solidFill>
-                      <a:prstDash val="solid"/>
-                      <a:round/>
-                      <a:headEnd type="none" w="med" len="med"/>
-                      <a:tailEnd type="none" w="med" len="med"/>
-                    </a:lnT>
-                    <a:lnB w="3810" cap="flat" cmpd="sng" algn="ctr">
-                      <a:solidFill>
-                        <a:srgbClr val="D5D5D5"/>
-                      </a:solidFill>
-                      <a:prstDash val="solid"/>
-                      <a:round/>
-                      <a:headEnd type="none" w="med" len="med"/>
-                      <a:tailEnd type="none" w="med" len="med"/>
-                    </a:lnB>
-                    <a:solidFill>
-                      <a:srgbClr val="FFFFFF"/>
-                    </a:solidFill>
-                  </a:tcPr>
-                </a:tc>
-                <a:extLst>
-                  <a:ext uri="{0D108BD9-81ED-4DB2-BD59-A6C34878D82A}">
-                    <a16:rowId xmlns:a16="http://schemas.microsoft.com/office/drawing/2014/main" val="3906420017"/>
-                  </a:ext>
-                </a:extLst>
-              </a:tr>
-              <a:tr h="220182">
-                <a:tc>
-                  <a:txBody>
-                    <a:bodyPr/>
-                    <a:lstStyle/>
-                    <a:p>
-                      <a:pPr algn="l" fontAlgn="t"/>
-                      <a:r>
-                        <a:rPr lang="en-US" sz="600">
-                          <a:effectLst/>
-                        </a:rPr>
-                        <a:t>Display correlation of measures</a:t>
-                      </a:r>
-                    </a:p>
-                  </a:txBody>
-                  <a:tcPr marL="12232" marR="12232" marT="12232" marB="12232">
-                    <a:lnL w="3810" cap="flat" cmpd="sng" algn="ctr">
-                      <a:solidFill>
-                        <a:srgbClr val="D5D5D5"/>
-                      </a:solidFill>
-                      <a:prstDash val="solid"/>
-                      <a:round/>
-                      <a:headEnd type="none" w="med" len="med"/>
-                      <a:tailEnd type="none" w="med" len="med"/>
-                    </a:lnL>
-                    <a:lnR w="3810" cap="flat" cmpd="sng" algn="ctr">
-                      <a:solidFill>
-                        <a:srgbClr val="D5D5D5"/>
-                      </a:solidFill>
-                      <a:prstDash val="solid"/>
-                      <a:round/>
-                      <a:headEnd type="none" w="med" len="med"/>
-                      <a:tailEnd type="none" w="med" len="med"/>
-                    </a:lnR>
-                    <a:lnT w="3810" cap="flat" cmpd="sng" algn="ctr">
-                      <a:solidFill>
-                        <a:srgbClr val="D5D5D5"/>
-                      </a:solidFill>
-                      <a:prstDash val="solid"/>
-                      <a:round/>
-                      <a:headEnd type="none" w="med" len="med"/>
-                      <a:tailEnd type="none" w="med" len="med"/>
-                    </a:lnT>
-                    <a:lnB w="3810" cap="flat" cmpd="sng" algn="ctr">
-                      <a:solidFill>
-                        <a:srgbClr val="D5D5D5"/>
-                      </a:solidFill>
-                      <a:prstDash val="solid"/>
-                      <a:round/>
-                      <a:headEnd type="none" w="med" len="med"/>
-                      <a:tailEnd type="none" w="med" len="med"/>
-                    </a:lnB>
-                    <a:solidFill>
-                      <a:srgbClr val="FFFFFF"/>
-                    </a:solidFill>
-                  </a:tcPr>
-                </a:tc>
-                <a:tc>
-                  <a:txBody>
-                    <a:bodyPr/>
-                    <a:lstStyle/>
-                    <a:p>
-                      <a:pPr algn="l" fontAlgn="t"/>
-                      <a:r>
-                        <a:rPr lang="en-US" sz="600" i="0" u="none" strike="noStrike">
-                          <a:solidFill>
-                            <a:srgbClr val="007FCA"/>
-                          </a:solidFill>
-                          <a:effectLst/>
-                          <a:hlinkClick r:id="rId15"/>
-                        </a:rPr>
-                        <a:t>Scatter plot</a:t>
-                      </a:r>
-                      <a:endParaRPr lang="en-US" sz="600">
-                        <a:effectLst/>
-                      </a:endParaRPr>
-                    </a:p>
-                  </a:txBody>
-                  <a:tcPr marL="12232" marR="12232" marT="12232" marB="12232">
-                    <a:lnL w="3810" cap="flat" cmpd="sng" algn="ctr">
-                      <a:solidFill>
-                        <a:srgbClr val="D5D5D5"/>
-                      </a:solidFill>
-                      <a:prstDash val="solid"/>
-                      <a:round/>
-                      <a:headEnd type="none" w="med" len="med"/>
-                      <a:tailEnd type="none" w="med" len="med"/>
-                    </a:lnL>
-                    <a:lnR w="3810" cap="flat" cmpd="sng" algn="ctr">
-                      <a:solidFill>
-                        <a:srgbClr val="D5D5D5"/>
-                      </a:solidFill>
-                      <a:prstDash val="solid"/>
-                      <a:round/>
-                      <a:headEnd type="none" w="med" len="med"/>
-                      <a:tailEnd type="none" w="med" len="med"/>
-                    </a:lnR>
-                    <a:lnT w="3810" cap="flat" cmpd="sng" algn="ctr">
-                      <a:solidFill>
-                        <a:srgbClr val="D5D5D5"/>
-                      </a:solidFill>
-                      <a:prstDash val="solid"/>
-                      <a:round/>
-                      <a:headEnd type="none" w="med" len="med"/>
-                      <a:tailEnd type="none" w="med" len="med"/>
-                    </a:lnT>
-                    <a:lnB w="3810" cap="flat" cmpd="sng" algn="ctr">
-                      <a:solidFill>
-                        <a:srgbClr val="D5D5D5"/>
-                      </a:solidFill>
-                      <a:prstDash val="solid"/>
-                      <a:round/>
-                      <a:headEnd type="none" w="med" len="med"/>
-                      <a:tailEnd type="none" w="med" len="med"/>
-                    </a:lnB>
-                    <a:solidFill>
-                      <a:srgbClr val="FFFFFF"/>
-                    </a:solidFill>
-                  </a:tcPr>
-                </a:tc>
-                <a:extLst>
-                  <a:ext uri="{0D108BD9-81ED-4DB2-BD59-A6C34878D82A}">
-                    <a16:rowId xmlns:a16="http://schemas.microsoft.com/office/drawing/2014/main" val="3034447055"/>
-                  </a:ext>
-                </a:extLst>
-              </a:tr>
-              <a:tr h="220182">
-                <a:tc>
-                  <a:txBody>
-                    <a:bodyPr/>
-                    <a:lstStyle/>
-                    <a:p>
-                      <a:pPr algn="l" fontAlgn="t"/>
-                      <a:r>
-                        <a:rPr lang="en-US" sz="600">
-                          <a:effectLst/>
-                        </a:rPr>
-                        <a:t>Display numbers and values</a:t>
-                      </a:r>
-                    </a:p>
-                  </a:txBody>
-                  <a:tcPr marL="12232" marR="12232" marT="12232" marB="12232">
-                    <a:lnL w="3810" cap="flat" cmpd="sng" algn="ctr">
-                      <a:solidFill>
-                        <a:srgbClr val="D5D5D5"/>
-                      </a:solidFill>
-                      <a:prstDash val="solid"/>
-                      <a:round/>
-                      <a:headEnd type="none" w="med" len="med"/>
-                      <a:tailEnd type="none" w="med" len="med"/>
-                    </a:lnL>
-                    <a:lnR w="3810" cap="flat" cmpd="sng" algn="ctr">
-                      <a:solidFill>
-                        <a:srgbClr val="D5D5D5"/>
-                      </a:solidFill>
-                      <a:prstDash val="solid"/>
-                      <a:round/>
-                      <a:headEnd type="none" w="med" len="med"/>
-                      <a:tailEnd type="none" w="med" len="med"/>
-                    </a:lnR>
-                    <a:lnT w="3810" cap="flat" cmpd="sng" algn="ctr">
-                      <a:solidFill>
-                        <a:srgbClr val="D5D5D5"/>
-                      </a:solidFill>
-                      <a:prstDash val="solid"/>
-                      <a:round/>
-                      <a:headEnd type="none" w="med" len="med"/>
-                      <a:tailEnd type="none" w="med" len="med"/>
-                    </a:lnT>
-                    <a:lnB w="3810" cap="flat" cmpd="sng" algn="ctr">
-                      <a:solidFill>
-                        <a:srgbClr val="D5D5D5"/>
-                      </a:solidFill>
-                      <a:prstDash val="solid"/>
-                      <a:round/>
-                      <a:headEnd type="none" w="med" len="med"/>
-                      <a:tailEnd type="none" w="med" len="med"/>
-                    </a:lnB>
-                    <a:solidFill>
-                      <a:srgbClr val="FFFFFF"/>
-                    </a:solidFill>
-                  </a:tcPr>
-                </a:tc>
-                <a:tc>
-                  <a:txBody>
-                    <a:bodyPr/>
-                    <a:lstStyle/>
-                    <a:p>
-                      <a:pPr algn="l" fontAlgn="t"/>
-                      <a:r>
-                        <a:rPr lang="en-US" sz="600" i="0" u="none" strike="noStrike">
-                          <a:solidFill>
-                            <a:srgbClr val="007FCA"/>
-                          </a:solidFill>
-                          <a:effectLst/>
-                          <a:hlinkClick r:id="rId16"/>
-                        </a:rPr>
-                        <a:t>Table</a:t>
-                      </a:r>
-                      <a:endParaRPr lang="en-US" sz="600">
-                        <a:effectLst/>
-                      </a:endParaRPr>
-                    </a:p>
-                  </a:txBody>
-                  <a:tcPr marL="12232" marR="12232" marT="12232" marB="12232">
-                    <a:lnL w="3810" cap="flat" cmpd="sng" algn="ctr">
-                      <a:solidFill>
-                        <a:srgbClr val="D5D5D5"/>
-                      </a:solidFill>
-                      <a:prstDash val="solid"/>
-                      <a:round/>
-                      <a:headEnd type="none" w="med" len="med"/>
-                      <a:tailEnd type="none" w="med" len="med"/>
-                    </a:lnL>
-                    <a:lnR w="3810" cap="flat" cmpd="sng" algn="ctr">
-                      <a:solidFill>
-                        <a:srgbClr val="D5D5D5"/>
-                      </a:solidFill>
-                      <a:prstDash val="solid"/>
-                      <a:round/>
-                      <a:headEnd type="none" w="med" len="med"/>
-                      <a:tailEnd type="none" w="med" len="med"/>
-                    </a:lnR>
-                    <a:lnT w="3810" cap="flat" cmpd="sng" algn="ctr">
-                      <a:solidFill>
-                        <a:srgbClr val="D5D5D5"/>
-                      </a:solidFill>
-                      <a:prstDash val="solid"/>
-                      <a:round/>
-                      <a:headEnd type="none" w="med" len="med"/>
-                      <a:tailEnd type="none" w="med" len="med"/>
-                    </a:lnT>
-                    <a:lnB w="3810" cap="flat" cmpd="sng" algn="ctr">
-                      <a:solidFill>
-                        <a:srgbClr val="D5D5D5"/>
-                      </a:solidFill>
-                      <a:prstDash val="solid"/>
-                      <a:round/>
-                      <a:headEnd type="none" w="med" len="med"/>
-                      <a:tailEnd type="none" w="med" len="med"/>
-                    </a:lnB>
-                    <a:solidFill>
-                      <a:srgbClr val="FFFFFF"/>
-                    </a:solidFill>
-                  </a:tcPr>
-                </a:tc>
-                <a:extLst>
-                  <a:ext uri="{0D108BD9-81ED-4DB2-BD59-A6C34878D82A}">
-                    <a16:rowId xmlns:a16="http://schemas.microsoft.com/office/drawing/2014/main" val="842653600"/>
-                  </a:ext>
-                </a:extLst>
-              </a:tr>
-              <a:tr h="318041">
-                <a:tc>
-                  <a:txBody>
-                    <a:bodyPr/>
-                    <a:lstStyle/>
-                    <a:p>
-                      <a:pPr algn="l" fontAlgn="t"/>
-                      <a:r>
-                        <a:rPr lang="en-US" sz="600">
-                          <a:effectLst/>
-                        </a:rPr>
-                        <a:t>Display text, images, links, and measures</a:t>
-                      </a:r>
-                    </a:p>
-                  </a:txBody>
-                  <a:tcPr marL="12232" marR="12232" marT="12232" marB="12232">
-                    <a:lnL w="3810" cap="flat" cmpd="sng" algn="ctr">
-                      <a:solidFill>
-                        <a:srgbClr val="D5D5D5"/>
-                      </a:solidFill>
-                      <a:prstDash val="solid"/>
-                      <a:round/>
-                      <a:headEnd type="none" w="med" len="med"/>
-                      <a:tailEnd type="none" w="med" len="med"/>
-                    </a:lnL>
-                    <a:lnR w="3810" cap="flat" cmpd="sng" algn="ctr">
-                      <a:solidFill>
-                        <a:srgbClr val="D5D5D5"/>
-                      </a:solidFill>
-                      <a:prstDash val="solid"/>
-                      <a:round/>
-                      <a:headEnd type="none" w="med" len="med"/>
-                      <a:tailEnd type="none" w="med" len="med"/>
-                    </a:lnR>
-                    <a:lnT w="3810" cap="flat" cmpd="sng" algn="ctr">
-                      <a:solidFill>
-                        <a:srgbClr val="D5D5D5"/>
-                      </a:solidFill>
-                      <a:prstDash val="solid"/>
-                      <a:round/>
-                      <a:headEnd type="none" w="med" len="med"/>
-                      <a:tailEnd type="none" w="med" len="med"/>
-                    </a:lnT>
-                    <a:lnB w="3810" cap="flat" cmpd="sng" algn="ctr">
-                      <a:solidFill>
-                        <a:srgbClr val="D5D5D5"/>
-                      </a:solidFill>
-                      <a:prstDash val="solid"/>
-                      <a:round/>
-                      <a:headEnd type="none" w="med" len="med"/>
-                      <a:tailEnd type="none" w="med" len="med"/>
-                    </a:lnB>
-                    <a:solidFill>
-                      <a:srgbClr val="FFFFFF"/>
-                    </a:solidFill>
-                  </a:tcPr>
-                </a:tc>
-                <a:tc>
-                  <a:txBody>
-                    <a:bodyPr/>
-                    <a:lstStyle/>
-                    <a:p>
-                      <a:pPr algn="l" fontAlgn="t"/>
-                      <a:r>
-                        <a:rPr lang="en-US" sz="600" i="0" u="none" strike="noStrike">
-                          <a:solidFill>
-                            <a:srgbClr val="007FCA"/>
-                          </a:solidFill>
-                          <a:effectLst/>
-                          <a:hlinkClick r:id="rId17"/>
-                        </a:rPr>
-                        <a:t>Text &amp; image</a:t>
-                      </a:r>
-                      <a:endParaRPr lang="en-US" sz="600">
-                        <a:effectLst/>
-                      </a:endParaRPr>
-                    </a:p>
-                  </a:txBody>
-                  <a:tcPr marL="12232" marR="12232" marT="12232" marB="12232">
-                    <a:lnL w="3810" cap="flat" cmpd="sng" algn="ctr">
-                      <a:solidFill>
-                        <a:srgbClr val="D5D5D5"/>
-                      </a:solidFill>
-                      <a:prstDash val="solid"/>
-                      <a:round/>
-                      <a:headEnd type="none" w="med" len="med"/>
-                      <a:tailEnd type="none" w="med" len="med"/>
-                    </a:lnL>
-                    <a:lnR w="3810" cap="flat" cmpd="sng" algn="ctr">
-                      <a:solidFill>
-                        <a:srgbClr val="D5D5D5"/>
-                      </a:solidFill>
-                      <a:prstDash val="solid"/>
-                      <a:round/>
-                      <a:headEnd type="none" w="med" len="med"/>
-                      <a:tailEnd type="none" w="med" len="med"/>
-                    </a:lnR>
-                    <a:lnT w="3810" cap="flat" cmpd="sng" algn="ctr">
-                      <a:solidFill>
-                        <a:srgbClr val="D5D5D5"/>
-                      </a:solidFill>
-                      <a:prstDash val="solid"/>
-                      <a:round/>
-                      <a:headEnd type="none" w="med" len="med"/>
-                      <a:tailEnd type="none" w="med" len="med"/>
-                    </a:lnT>
-                    <a:lnB w="3810" cap="flat" cmpd="sng" algn="ctr">
-                      <a:solidFill>
-                        <a:srgbClr val="D5D5D5"/>
-                      </a:solidFill>
-                      <a:prstDash val="solid"/>
-                      <a:round/>
-                      <a:headEnd type="none" w="med" len="med"/>
-                      <a:tailEnd type="none" w="med" len="med"/>
-                    </a:lnB>
-                    <a:solidFill>
-                      <a:srgbClr val="FFFFFF"/>
-                    </a:solidFill>
-                  </a:tcPr>
-                </a:tc>
-                <a:extLst>
-                  <a:ext uri="{0D108BD9-81ED-4DB2-BD59-A6C34878D82A}">
-                    <a16:rowId xmlns:a16="http://schemas.microsoft.com/office/drawing/2014/main" val="3741210863"/>
-                  </a:ext>
-                </a:extLst>
-              </a:tr>
-              <a:tr h="220182">
-                <a:tc>
-                  <a:txBody>
-                    <a:bodyPr/>
-                    <a:lstStyle/>
-                    <a:p>
-                      <a:pPr algn="l" fontAlgn="t"/>
-                      <a:r>
-                        <a:rPr lang="en-US" sz="600">
-                          <a:effectLst/>
-                        </a:rPr>
-                        <a:t>Display hierarchical data</a:t>
-                      </a:r>
-                    </a:p>
-                  </a:txBody>
-                  <a:tcPr marL="12232" marR="12232" marT="12232" marB="12232">
-                    <a:lnL w="3810" cap="flat" cmpd="sng" algn="ctr">
-                      <a:solidFill>
-                        <a:srgbClr val="D5D5D5"/>
-                      </a:solidFill>
-                      <a:prstDash val="solid"/>
-                      <a:round/>
-                      <a:headEnd type="none" w="med" len="med"/>
-                      <a:tailEnd type="none" w="med" len="med"/>
-                    </a:lnL>
-                    <a:lnR w="3810" cap="flat" cmpd="sng" algn="ctr">
-                      <a:solidFill>
-                        <a:srgbClr val="D5D5D5"/>
-                      </a:solidFill>
-                      <a:prstDash val="solid"/>
-                      <a:round/>
-                      <a:headEnd type="none" w="med" len="med"/>
-                      <a:tailEnd type="none" w="med" len="med"/>
-                    </a:lnR>
-                    <a:lnT w="3810" cap="flat" cmpd="sng" algn="ctr">
-                      <a:solidFill>
-                        <a:srgbClr val="D5D5D5"/>
-                      </a:solidFill>
-                      <a:prstDash val="solid"/>
-                      <a:round/>
-                      <a:headEnd type="none" w="med" len="med"/>
-                      <a:tailEnd type="none" w="med" len="med"/>
-                    </a:lnT>
-                    <a:lnB w="3810" cap="flat" cmpd="sng" algn="ctr">
-                      <a:solidFill>
-                        <a:srgbClr val="D5D5D5"/>
-                      </a:solidFill>
-                      <a:prstDash val="solid"/>
-                      <a:round/>
-                      <a:headEnd type="none" w="med" len="med"/>
-                      <a:tailEnd type="none" w="med" len="med"/>
-                    </a:lnB>
-                    <a:solidFill>
-                      <a:srgbClr val="FFFFFF"/>
-                    </a:solidFill>
-                  </a:tcPr>
-                </a:tc>
-                <a:tc>
-                  <a:txBody>
-                    <a:bodyPr/>
-                    <a:lstStyle/>
-                    <a:p>
-                      <a:pPr algn="l" fontAlgn="t"/>
-                      <a:r>
-                        <a:rPr lang="en-US" sz="600" i="0" u="none" strike="noStrike">
-                          <a:solidFill>
-                            <a:srgbClr val="007FCA"/>
-                          </a:solidFill>
-                          <a:effectLst/>
-                          <a:hlinkClick r:id="rId18"/>
-                        </a:rPr>
-                        <a:t>Treemap</a:t>
-                      </a:r>
-                      <a:endParaRPr lang="en-US" sz="600">
-                        <a:effectLst/>
-                      </a:endParaRPr>
-                    </a:p>
-                  </a:txBody>
-                  <a:tcPr marL="12232" marR="12232" marT="12232" marB="12232">
-                    <a:lnL w="3810" cap="flat" cmpd="sng" algn="ctr">
-                      <a:solidFill>
-                        <a:srgbClr val="D5D5D5"/>
-                      </a:solidFill>
-                      <a:prstDash val="solid"/>
-                      <a:round/>
-                      <a:headEnd type="none" w="med" len="med"/>
-                      <a:tailEnd type="none" w="med" len="med"/>
-                    </a:lnL>
-                    <a:lnR w="3810" cap="flat" cmpd="sng" algn="ctr">
-                      <a:solidFill>
-                        <a:srgbClr val="D5D5D5"/>
-                      </a:solidFill>
-                      <a:prstDash val="solid"/>
-                      <a:round/>
-                      <a:headEnd type="none" w="med" len="med"/>
-                      <a:tailEnd type="none" w="med" len="med"/>
-                    </a:lnR>
-                    <a:lnT w="3810" cap="flat" cmpd="sng" algn="ctr">
-                      <a:solidFill>
-                        <a:srgbClr val="D5D5D5"/>
-                      </a:solidFill>
-                      <a:prstDash val="solid"/>
-                      <a:round/>
-                      <a:headEnd type="none" w="med" len="med"/>
-                      <a:tailEnd type="none" w="med" len="med"/>
-                    </a:lnT>
-                    <a:lnB w="3810" cap="flat" cmpd="sng" algn="ctr">
-                      <a:solidFill>
-                        <a:srgbClr val="D5D5D5"/>
-                      </a:solidFill>
-                      <a:prstDash val="solid"/>
-                      <a:round/>
-                      <a:headEnd type="none" w="med" len="med"/>
-                      <a:tailEnd type="none" w="med" len="med"/>
-                    </a:lnB>
-                    <a:solidFill>
-                      <a:srgbClr val="FFFFFF"/>
-                    </a:solidFill>
-                  </a:tcPr>
-                </a:tc>
-                <a:extLst>
-                  <a:ext uri="{0D108BD9-81ED-4DB2-BD59-A6C34878D82A}">
-                    <a16:rowId xmlns:a16="http://schemas.microsoft.com/office/drawing/2014/main" val="2403309222"/>
-                  </a:ext>
-                </a:extLst>
-              </a:tr>
-              <a:tr h="415899">
-                <a:tc>
-                  <a:txBody>
-                    <a:bodyPr/>
-                    <a:lstStyle/>
-                    <a:p>
-                      <a:pPr algn="l" fontAlgn="t"/>
-                      <a:r>
-                        <a:rPr lang="en-US" sz="600">
-                          <a:effectLst/>
-                        </a:rPr>
-                        <a:t>Compare range and distribution for groups of numerical data.</a:t>
-                      </a:r>
-                    </a:p>
-                  </a:txBody>
-                  <a:tcPr marL="12232" marR="12232" marT="12232" marB="12232">
-                    <a:lnL w="3810" cap="flat" cmpd="sng" algn="ctr">
-                      <a:solidFill>
-                        <a:srgbClr val="D5D5D5"/>
-                      </a:solidFill>
-                      <a:prstDash val="solid"/>
-                      <a:round/>
-                      <a:headEnd type="none" w="med" len="med"/>
-                      <a:tailEnd type="none" w="med" len="med"/>
-                    </a:lnL>
-                    <a:lnR w="3810" cap="flat" cmpd="sng" algn="ctr">
-                      <a:solidFill>
-                        <a:srgbClr val="D5D5D5"/>
-                      </a:solidFill>
-                      <a:prstDash val="solid"/>
-                      <a:round/>
-                      <a:headEnd type="none" w="med" len="med"/>
-                      <a:tailEnd type="none" w="med" len="med"/>
-                    </a:lnR>
-                    <a:lnT w="3810" cap="flat" cmpd="sng" algn="ctr">
-                      <a:solidFill>
-                        <a:srgbClr val="D5D5D5"/>
-                      </a:solidFill>
-                      <a:prstDash val="solid"/>
-                      <a:round/>
-                      <a:headEnd type="none" w="med" len="med"/>
-                      <a:tailEnd type="none" w="med" len="med"/>
-                    </a:lnT>
-                    <a:lnB w="3810" cap="flat" cmpd="sng" algn="ctr">
-                      <a:solidFill>
-                        <a:srgbClr val="D5D5D5"/>
-                      </a:solidFill>
-                      <a:prstDash val="solid"/>
-                      <a:round/>
-                      <a:headEnd type="none" w="med" len="med"/>
-                      <a:tailEnd type="none" w="med" len="med"/>
-                    </a:lnB>
-                    <a:solidFill>
-                      <a:srgbClr val="FFFFFF"/>
-                    </a:solidFill>
-                  </a:tcPr>
-                </a:tc>
-                <a:tc>
-                  <a:txBody>
-                    <a:bodyPr/>
-                    <a:lstStyle/>
-                    <a:p>
-                      <a:pPr algn="l" fontAlgn="t"/>
-                      <a:r>
-                        <a:rPr lang="en-US" sz="600" i="0" u="none" strike="noStrike">
-                          <a:solidFill>
-                            <a:srgbClr val="007FCA"/>
-                          </a:solidFill>
-                          <a:effectLst/>
-                          <a:hlinkClick r:id="rId19"/>
-                        </a:rPr>
-                        <a:t>Box plot</a:t>
-                      </a:r>
-                      <a:endParaRPr lang="en-US" sz="600">
-                        <a:effectLst/>
-                      </a:endParaRPr>
-                    </a:p>
-                  </a:txBody>
-                  <a:tcPr marL="12232" marR="12232" marT="12232" marB="12232">
-                    <a:lnL w="3810" cap="flat" cmpd="sng" algn="ctr">
-                      <a:solidFill>
-                        <a:srgbClr val="D5D5D5"/>
-                      </a:solidFill>
-                      <a:prstDash val="solid"/>
-                      <a:round/>
-                      <a:headEnd type="none" w="med" len="med"/>
-                      <a:tailEnd type="none" w="med" len="med"/>
-                    </a:lnL>
-                    <a:lnR w="3810" cap="flat" cmpd="sng" algn="ctr">
-                      <a:solidFill>
-                        <a:srgbClr val="D5D5D5"/>
-                      </a:solidFill>
-                      <a:prstDash val="solid"/>
-                      <a:round/>
-                      <a:headEnd type="none" w="med" len="med"/>
-                      <a:tailEnd type="none" w="med" len="med"/>
-                    </a:lnR>
-                    <a:lnT w="3810" cap="flat" cmpd="sng" algn="ctr">
-                      <a:solidFill>
-                        <a:srgbClr val="D5D5D5"/>
-                      </a:solidFill>
-                      <a:prstDash val="solid"/>
-                      <a:round/>
-                      <a:headEnd type="none" w="med" len="med"/>
-                      <a:tailEnd type="none" w="med" len="med"/>
-                    </a:lnT>
-                    <a:lnB w="3810" cap="flat" cmpd="sng" algn="ctr">
-                      <a:solidFill>
-                        <a:srgbClr val="D5D5D5"/>
-                      </a:solidFill>
-                      <a:prstDash val="solid"/>
-                      <a:round/>
-                      <a:headEnd type="none" w="med" len="med"/>
-                      <a:tailEnd type="none" w="med" len="med"/>
-                    </a:lnB>
-                    <a:solidFill>
-                      <a:srgbClr val="FFFFFF"/>
-                    </a:solidFill>
-                  </a:tcPr>
-                </a:tc>
-                <a:extLst>
-                  <a:ext uri="{0D108BD9-81ED-4DB2-BD59-A6C34878D82A}">
-                    <a16:rowId xmlns:a16="http://schemas.microsoft.com/office/drawing/2014/main" val="971561681"/>
-                  </a:ext>
-                </a:extLst>
-              </a:tr>
-              <a:tr h="122323">
-                <a:tc>
-                  <a:txBody>
-                    <a:bodyPr/>
-                    <a:lstStyle/>
-                    <a:p>
-                      <a:pPr algn="l" fontAlgn="t"/>
-                      <a:r>
-                        <a:rPr lang="en-US" sz="600">
-                          <a:effectLst/>
-                        </a:rPr>
-                        <a:t> </a:t>
-                      </a:r>
-                    </a:p>
-                  </a:txBody>
-                  <a:tcPr marL="12232" marR="12232" marT="12232" marB="12232">
-                    <a:lnL w="3810" cap="flat" cmpd="sng" algn="ctr">
-                      <a:solidFill>
-                        <a:srgbClr val="D5D5D5"/>
-                      </a:solidFill>
-                      <a:prstDash val="solid"/>
-                      <a:round/>
-                      <a:headEnd type="none" w="med" len="med"/>
-                      <a:tailEnd type="none" w="med" len="med"/>
-                    </a:lnL>
-                    <a:lnR w="3810" cap="flat" cmpd="sng" algn="ctr">
-                      <a:solidFill>
-                        <a:srgbClr val="D5D5D5"/>
-                      </a:solidFill>
-                      <a:prstDash val="solid"/>
-                      <a:round/>
-                      <a:headEnd type="none" w="med" len="med"/>
-                      <a:tailEnd type="none" w="med" len="med"/>
-                    </a:lnR>
-                    <a:lnT w="3810" cap="flat" cmpd="sng" algn="ctr">
-                      <a:solidFill>
-                        <a:srgbClr val="D5D5D5"/>
-                      </a:solidFill>
-                      <a:prstDash val="solid"/>
-                      <a:round/>
-                      <a:headEnd type="none" w="med" len="med"/>
-                      <a:tailEnd type="none" w="med" len="med"/>
-                    </a:lnT>
-                    <a:lnB w="3810" cap="flat" cmpd="sng" algn="ctr">
-                      <a:solidFill>
-                        <a:srgbClr val="D5D5D5"/>
-                      </a:solidFill>
-                      <a:prstDash val="solid"/>
-                      <a:round/>
-                      <a:headEnd type="none" w="med" len="med"/>
-                      <a:tailEnd type="none" w="med" len="med"/>
-                    </a:lnB>
-                    <a:solidFill>
-                      <a:srgbClr val="FFFFFF"/>
-                    </a:solidFill>
-                  </a:tcPr>
-                </a:tc>
-                <a:tc>
-                  <a:txBody>
-                    <a:bodyPr/>
-                    <a:lstStyle/>
-                    <a:p>
-                      <a:pPr algn="l" fontAlgn="t"/>
-                      <a:r>
-                        <a:rPr lang="en-US" sz="600" i="0" u="none" strike="noStrike">
-                          <a:solidFill>
-                            <a:srgbClr val="007FCA"/>
-                          </a:solidFill>
-                          <a:effectLst/>
-                          <a:hlinkClick r:id="rId20"/>
-                        </a:rPr>
-                        <a:t>Distribution plot</a:t>
-                      </a:r>
-                      <a:endParaRPr lang="en-US" sz="600">
-                        <a:effectLst/>
-                      </a:endParaRPr>
-                    </a:p>
-                  </a:txBody>
-                  <a:tcPr marL="12232" marR="12232" marT="12232" marB="12232">
-                    <a:lnL w="3810" cap="flat" cmpd="sng" algn="ctr">
-                      <a:solidFill>
-                        <a:srgbClr val="D5D5D5"/>
-                      </a:solidFill>
-                      <a:prstDash val="solid"/>
-                      <a:round/>
-                      <a:headEnd type="none" w="med" len="med"/>
-                      <a:tailEnd type="none" w="med" len="med"/>
-                    </a:lnL>
-                    <a:lnR w="3810" cap="flat" cmpd="sng" algn="ctr">
-                      <a:solidFill>
-                        <a:srgbClr val="D5D5D5"/>
-                      </a:solidFill>
-                      <a:prstDash val="solid"/>
-                      <a:round/>
-                      <a:headEnd type="none" w="med" len="med"/>
-                      <a:tailEnd type="none" w="med" len="med"/>
-                    </a:lnR>
-                    <a:lnT w="3810" cap="flat" cmpd="sng" algn="ctr">
-                      <a:solidFill>
-                        <a:srgbClr val="D5D5D5"/>
-                      </a:solidFill>
-                      <a:prstDash val="solid"/>
-                      <a:round/>
-                      <a:headEnd type="none" w="med" len="med"/>
-                      <a:tailEnd type="none" w="med" len="med"/>
-                    </a:lnT>
-                    <a:lnB w="3810" cap="flat" cmpd="sng" algn="ctr">
-                      <a:solidFill>
-                        <a:srgbClr val="D5D5D5"/>
-                      </a:solidFill>
-                      <a:prstDash val="solid"/>
-                      <a:round/>
-                      <a:headEnd type="none" w="med" len="med"/>
-                      <a:tailEnd type="none" w="med" len="med"/>
-                    </a:lnB>
-                    <a:solidFill>
-                      <a:srgbClr val="FFFFFF"/>
-                    </a:solidFill>
-                  </a:tcPr>
-                </a:tc>
-                <a:extLst>
-                  <a:ext uri="{0D108BD9-81ED-4DB2-BD59-A6C34878D82A}">
-                    <a16:rowId xmlns:a16="http://schemas.microsoft.com/office/drawing/2014/main" val="958084955"/>
-                  </a:ext>
-                </a:extLst>
-              </a:tr>
-              <a:tr h="709475">
-                <a:tc>
-                  <a:txBody>
-                    <a:bodyPr/>
-                    <a:lstStyle/>
-                    <a:p>
-                      <a:pPr algn="l" fontAlgn="t"/>
-                      <a:r>
-                        <a:rPr lang="en-US" sz="600">
-                          <a:effectLst/>
-                        </a:rPr>
-                        <a:t>Display distribution of numerical data over a continuous interval, or a certain time period.</a:t>
-                      </a:r>
-                    </a:p>
-                  </a:txBody>
-                  <a:tcPr marL="12232" marR="12232" marT="12232" marB="12232">
-                    <a:lnL w="3810" cap="flat" cmpd="sng" algn="ctr">
-                      <a:solidFill>
-                        <a:srgbClr val="D5D5D5"/>
-                      </a:solidFill>
-                      <a:prstDash val="solid"/>
-                      <a:round/>
-                      <a:headEnd type="none" w="med" len="med"/>
-                      <a:tailEnd type="none" w="med" len="med"/>
-                    </a:lnL>
-                    <a:lnR w="3810" cap="flat" cmpd="sng" algn="ctr">
-                      <a:solidFill>
-                        <a:srgbClr val="D5D5D5"/>
-                      </a:solidFill>
-                      <a:prstDash val="solid"/>
-                      <a:round/>
-                      <a:headEnd type="none" w="med" len="med"/>
-                      <a:tailEnd type="none" w="med" len="med"/>
-                    </a:lnR>
-                    <a:lnT w="3810" cap="flat" cmpd="sng" algn="ctr">
-                      <a:solidFill>
-                        <a:srgbClr val="D5D5D5"/>
-                      </a:solidFill>
-                      <a:prstDash val="solid"/>
-                      <a:round/>
-                      <a:headEnd type="none" w="med" len="med"/>
-                      <a:tailEnd type="none" w="med" len="med"/>
-                    </a:lnT>
-                    <a:lnB w="3810" cap="flat" cmpd="sng" algn="ctr">
-                      <a:solidFill>
-                        <a:srgbClr val="D5D5D5"/>
-                      </a:solidFill>
-                      <a:prstDash val="solid"/>
-                      <a:round/>
-                      <a:headEnd type="none" w="med" len="med"/>
-                      <a:tailEnd type="none" w="med" len="med"/>
-                    </a:lnB>
-                    <a:solidFill>
-                      <a:srgbClr val="FFFFFF"/>
-                    </a:solidFill>
-                  </a:tcPr>
-                </a:tc>
-                <a:tc>
-                  <a:txBody>
-                    <a:bodyPr/>
-                    <a:lstStyle/>
-                    <a:p>
-                      <a:pPr algn="l" fontAlgn="t"/>
-                      <a:r>
-                        <a:rPr lang="en-US" sz="600" i="0" u="none" strike="noStrike" dirty="0">
-                          <a:solidFill>
-                            <a:srgbClr val="007FCA"/>
-                          </a:solidFill>
-                          <a:effectLst/>
-                          <a:hlinkClick r:id="rId21"/>
-                        </a:rPr>
-                        <a:t>Histogram</a:t>
-                      </a:r>
-                      <a:endParaRPr lang="en-US" sz="600" dirty="0">
-                        <a:effectLst/>
-                      </a:endParaRPr>
-                    </a:p>
-                  </a:txBody>
-                  <a:tcPr marL="12232" marR="12232" marT="12232" marB="12232">
-                    <a:lnL w="3810" cap="flat" cmpd="sng" algn="ctr">
-                      <a:solidFill>
-                        <a:srgbClr val="D5D5D5"/>
-                      </a:solidFill>
-                      <a:prstDash val="solid"/>
-                      <a:round/>
-                      <a:headEnd type="none" w="med" len="med"/>
-                      <a:tailEnd type="none" w="med" len="med"/>
-                    </a:lnL>
-                    <a:lnR w="3810" cap="flat" cmpd="sng" algn="ctr">
-                      <a:solidFill>
-                        <a:srgbClr val="D5D5D5"/>
-                      </a:solidFill>
-                      <a:prstDash val="solid"/>
-                      <a:round/>
-                      <a:headEnd type="none" w="med" len="med"/>
-                      <a:tailEnd type="none" w="med" len="med"/>
-                    </a:lnR>
-                    <a:lnT w="3810" cap="flat" cmpd="sng" algn="ctr">
-                      <a:solidFill>
-                        <a:srgbClr val="D5D5D5"/>
-                      </a:solidFill>
-                      <a:prstDash val="solid"/>
-                      <a:round/>
-                      <a:headEnd type="none" w="med" len="med"/>
-                      <a:tailEnd type="none" w="med" len="med"/>
-                    </a:lnT>
-                    <a:lnB w="3810" cap="flat" cmpd="sng" algn="ctr">
-                      <a:solidFill>
-                        <a:srgbClr val="D5D5D5"/>
-                      </a:solidFill>
-                      <a:prstDash val="solid"/>
-                      <a:round/>
-                      <a:headEnd type="none" w="med" len="med"/>
-                      <a:tailEnd type="none" w="med" len="med"/>
-                    </a:lnB>
-                    <a:solidFill>
-                      <a:srgbClr val="FFFFFF"/>
-                    </a:solidFill>
-                  </a:tcPr>
-                </a:tc>
-                <a:extLst>
-                  <a:ext uri="{0D108BD9-81ED-4DB2-BD59-A6C34878D82A}">
-                    <a16:rowId xmlns:a16="http://schemas.microsoft.com/office/drawing/2014/main" val="2860199246"/>
-                  </a:ext>
-                </a:extLst>
-              </a:tr>
-            </a:tbl>
-          </a:graphicData>
-        </a:graphic>
-      </p:graphicFrame>
-      <p:sp>
-        <p:nvSpPr>
-          <p:cNvPr id="3" name="TextBox 2">
-            <a:extLst>
-              <a:ext uri="{FF2B5EF4-FFF2-40B4-BE49-F238E27FC236}">
-                <a16:creationId xmlns:a16="http://schemas.microsoft.com/office/drawing/2014/main" id="{D6F96659-B369-4008-BD85-0506393EBBE4}"/>
-              </a:ext>
-            </a:extLst>
-          </p:cNvPr>
-          <p:cNvSpPr txBox="1"/>
-          <p:nvPr/>
-        </p:nvSpPr>
-        <p:spPr>
-          <a:xfrm>
-            <a:off x="7079530" y="4477732"/>
-            <a:ext cx="10583346" cy="307777"/>
-          </a:xfrm>
-          <a:prstGeom prst="rect">
-            <a:avLst/>
-          </a:prstGeom>
-          <a:noFill/>
-        </p:spPr>
-        <p:txBody>
-          <a:bodyPr wrap="none" rtlCol="0">
-            <a:spAutoFit/>
-          </a:bodyPr>
-          <a:lstStyle/>
-          <a:p>
-            <a:r>
-              <a:rPr lang="en-US" dirty="0"/>
-              <a:t>http://espalhe.com.br/en-US/sense-cloud/Subsystems/CloudHub/Content/Visualizations/when-to-use-what-type-of-visualization.htm</a:t>
-            </a:r>
           </a:p>
         </p:txBody>
       </p:sp>
     </p:spTree>
     <p:extLst>
       <p:ext uri="{BB962C8B-B14F-4D97-AF65-F5344CB8AC3E}">
-        <p14:creationId xmlns:p14="http://schemas.microsoft.com/office/powerpoint/2010/main" val="945424779"/>
+        <p14:creationId xmlns:p14="http://schemas.microsoft.com/office/powerpoint/2010/main" val="633431925"/>
       </p:ext>
     </p:extLst>
   </p:cSld>

</xml_diff>

<commit_message>
Actualizacion presentaciones Lección 4
Presentaciones lección 4
</commit_message>
<xml_diff>
--- a/18-data-visualization/Contenido Semana 2/4.2. Presentación - Visualizaciones Tradicionales.pptx
+++ b/18-data-visualization/Contenido Semana 2/4.2. Presentación - Visualizaciones Tradicionales.pptx
@@ -19,21 +19,21 @@
   <p:notesSz cx="6858000" cy="9144000"/>
   <p:embeddedFontLst>
     <p:embeddedFont>
-      <p:font typeface="Raleway" panose="020B0604020202020204" charset="0"/>
+      <p:font typeface="Montserrat" panose="020B0604020202020204" charset="0"/>
       <p:regular r:id="rId9"/>
       <p:bold r:id="rId10"/>
       <p:italic r:id="rId11"/>
       <p:boldItalic r:id="rId12"/>
     </p:embeddedFont>
     <p:embeddedFont>
-      <p:font typeface="Montserrat" panose="020B0604020202020204" charset="0"/>
+      <p:font typeface="Calibri" panose="020F0502020204030204" pitchFamily="34" charset="0"/>
       <p:regular r:id="rId13"/>
       <p:bold r:id="rId14"/>
       <p:italic r:id="rId15"/>
       <p:boldItalic r:id="rId16"/>
     </p:embeddedFont>
     <p:embeddedFont>
-      <p:font typeface="Calibri" panose="020F0502020204030204" pitchFamily="34" charset="0"/>
+      <p:font typeface="Raleway" panose="020B0604020202020204" charset="0"/>
       <p:regular r:id="rId17"/>
       <p:bold r:id="rId18"/>
       <p:italic r:id="rId19"/>
@@ -10843,7 +10843,7 @@
         </p:nvSpPr>
         <p:spPr>
           <a:xfrm>
-            <a:off x="158389" y="5273988"/>
+            <a:off x="158389" y="4769655"/>
             <a:ext cx="3261841" cy="307777"/>
           </a:xfrm>
           <a:prstGeom prst="rect">
@@ -10891,7 +10891,7 @@
         </p:blipFill>
         <p:spPr>
           <a:xfrm>
-            <a:off x="221548" y="5901133"/>
+            <a:off x="221548" y="5396800"/>
             <a:ext cx="575360" cy="746825"/>
           </a:xfrm>
           <a:prstGeom prst="rect">
@@ -10921,7 +10921,7 @@
         </p:blipFill>
         <p:spPr>
           <a:xfrm>
-            <a:off x="2163246" y="5901133"/>
+            <a:off x="2163246" y="5396800"/>
             <a:ext cx="624894" cy="712532"/>
           </a:xfrm>
           <a:prstGeom prst="rect">
@@ -10951,7 +10951,7 @@
         </p:blipFill>
         <p:spPr>
           <a:xfrm>
-            <a:off x="3068026" y="5886694"/>
+            <a:off x="3068026" y="5382361"/>
             <a:ext cx="567739" cy="708721"/>
           </a:xfrm>
           <a:prstGeom prst="rect">
@@ -10981,7 +10981,7 @@
         </p:blipFill>
         <p:spPr>
           <a:xfrm>
-            <a:off x="1160972" y="5901133"/>
+            <a:off x="1160972" y="5396800"/>
             <a:ext cx="563929" cy="712532"/>
           </a:xfrm>
           <a:prstGeom prst="rect">
@@ -11313,6 +11313,52 @@
           </a:fontRef>
         </p:style>
       </p:cxnSp>
+      <p:sp>
+        <p:nvSpPr>
+          <p:cNvPr id="24" name="TextBox 23">
+            <a:extLst>
+              <a:ext uri="{FF2B5EF4-FFF2-40B4-BE49-F238E27FC236}">
+                <a16:creationId xmlns:a16="http://schemas.microsoft.com/office/drawing/2014/main" id="{3CBF3750-1B17-4584-B22C-EDBB2A2BF626}"/>
+              </a:ext>
+            </a:extLst>
+          </p:cNvPr>
+          <p:cNvSpPr txBox="1"/>
+          <p:nvPr/>
+        </p:nvSpPr>
+        <p:spPr>
+          <a:xfrm>
+            <a:off x="226246" y="6315959"/>
+            <a:ext cx="3262432" cy="307777"/>
+          </a:xfrm>
+          <a:prstGeom prst="rect">
+            <a:avLst/>
+          </a:prstGeom>
+          <a:noFill/>
+        </p:spPr>
+        <p:txBody>
+          <a:bodyPr wrap="none" rtlCol="0">
+            <a:spAutoFit/>
+          </a:bodyPr>
+          <a:lstStyle/>
+          <a:p>
+            <a:r>
+              <a:rPr lang="es-VE" b="1" dirty="0">
+                <a:latin typeface="Raleway" panose="020B0604020202020204" charset="0"/>
+              </a:rPr>
+              <a:t>Fuente</a:t>
+            </a:r>
+            <a:r>
+              <a:rPr lang="es-VE" dirty="0">
+                <a:latin typeface="Raleway" panose="020B0604020202020204" charset="0"/>
+              </a:rPr>
+              <a:t>: http://online-behavior.com/</a:t>
+            </a:r>
+            <a:endParaRPr lang="en-US" dirty="0">
+              <a:latin typeface="Raleway" panose="020B0604020202020204" charset="0"/>
+            </a:endParaRPr>
+          </a:p>
+        </p:txBody>
+      </p:sp>
     </p:spTree>
     <p:extLst>
       <p:ext uri="{BB962C8B-B14F-4D97-AF65-F5344CB8AC3E}">
@@ -11626,7 +11672,7 @@
         </p:nvSpPr>
         <p:spPr>
           <a:xfrm>
-            <a:off x="158389" y="5273988"/>
+            <a:off x="158389" y="4863925"/>
             <a:ext cx="3261841" cy="307777"/>
           </a:xfrm>
           <a:prstGeom prst="rect">
@@ -11872,7 +11918,7 @@
         </p:blipFill>
         <p:spPr>
           <a:xfrm>
-            <a:off x="958461" y="5792518"/>
+            <a:off x="958461" y="5382455"/>
             <a:ext cx="586791" cy="731583"/>
           </a:xfrm>
           <a:prstGeom prst="rect">
@@ -11880,6 +11926,52 @@
           </a:prstGeom>
         </p:spPr>
       </p:pic>
+      <p:sp>
+        <p:nvSpPr>
+          <p:cNvPr id="13" name="TextBox 12">
+            <a:extLst>
+              <a:ext uri="{FF2B5EF4-FFF2-40B4-BE49-F238E27FC236}">
+                <a16:creationId xmlns:a16="http://schemas.microsoft.com/office/drawing/2014/main" id="{06E30062-0258-4876-9413-6A1905EB3A15}"/>
+              </a:ext>
+            </a:extLst>
+          </p:cNvPr>
+          <p:cNvSpPr txBox="1"/>
+          <p:nvPr/>
+        </p:nvSpPr>
+        <p:spPr>
+          <a:xfrm>
+            <a:off x="315800" y="6315959"/>
+            <a:ext cx="3262432" cy="307777"/>
+          </a:xfrm>
+          <a:prstGeom prst="rect">
+            <a:avLst/>
+          </a:prstGeom>
+          <a:noFill/>
+        </p:spPr>
+        <p:txBody>
+          <a:bodyPr wrap="none" rtlCol="0">
+            <a:spAutoFit/>
+          </a:bodyPr>
+          <a:lstStyle/>
+          <a:p>
+            <a:r>
+              <a:rPr lang="es-VE" b="1" dirty="0">
+                <a:latin typeface="Raleway" panose="020B0604020202020204" charset="0"/>
+              </a:rPr>
+              <a:t>Fuente</a:t>
+            </a:r>
+            <a:r>
+              <a:rPr lang="es-VE" dirty="0">
+                <a:latin typeface="Raleway" panose="020B0604020202020204" charset="0"/>
+              </a:rPr>
+              <a:t>: http://online-behavior.com/</a:t>
+            </a:r>
+            <a:endParaRPr lang="en-US" dirty="0">
+              <a:latin typeface="Raleway" panose="020B0604020202020204" charset="0"/>
+            </a:endParaRPr>
+          </a:p>
+        </p:txBody>
+      </p:sp>
     </p:spTree>
     <p:extLst>
       <p:ext uri="{BB962C8B-B14F-4D97-AF65-F5344CB8AC3E}">
@@ -12375,6 +12467,52 @@
           </a:fontRef>
         </p:style>
       </p:cxnSp>
+      <p:sp>
+        <p:nvSpPr>
+          <p:cNvPr id="11" name="TextBox 10">
+            <a:extLst>
+              <a:ext uri="{FF2B5EF4-FFF2-40B4-BE49-F238E27FC236}">
+                <a16:creationId xmlns:a16="http://schemas.microsoft.com/office/drawing/2014/main" id="{EE3DD7A5-55DB-4435-8553-4D03D5C1E523}"/>
+              </a:ext>
+            </a:extLst>
+          </p:cNvPr>
+          <p:cNvSpPr txBox="1"/>
+          <p:nvPr/>
+        </p:nvSpPr>
+        <p:spPr>
+          <a:xfrm>
+            <a:off x="65988" y="6315959"/>
+            <a:ext cx="3262432" cy="307777"/>
+          </a:xfrm>
+          <a:prstGeom prst="rect">
+            <a:avLst/>
+          </a:prstGeom>
+          <a:noFill/>
+        </p:spPr>
+        <p:txBody>
+          <a:bodyPr wrap="none" rtlCol="0">
+            <a:spAutoFit/>
+          </a:bodyPr>
+          <a:lstStyle/>
+          <a:p>
+            <a:r>
+              <a:rPr lang="es-VE" b="1" dirty="0">
+                <a:latin typeface="Raleway" panose="020B0604020202020204" charset="0"/>
+              </a:rPr>
+              <a:t>Fuente</a:t>
+            </a:r>
+            <a:r>
+              <a:rPr lang="es-VE" dirty="0">
+                <a:latin typeface="Raleway" panose="020B0604020202020204" charset="0"/>
+              </a:rPr>
+              <a:t>: http://online-behavior.com/</a:t>
+            </a:r>
+            <a:endParaRPr lang="en-US" dirty="0">
+              <a:latin typeface="Raleway" panose="020B0604020202020204" charset="0"/>
+            </a:endParaRPr>
+          </a:p>
+        </p:txBody>
+      </p:sp>
     </p:spTree>
     <p:extLst>
       <p:ext uri="{BB962C8B-B14F-4D97-AF65-F5344CB8AC3E}">
@@ -13006,6 +13144,52 @@
           </a:p>
         </p:txBody>
       </p:sp>
+      <p:sp>
+        <p:nvSpPr>
+          <p:cNvPr id="15" name="TextBox 14">
+            <a:extLst>
+              <a:ext uri="{FF2B5EF4-FFF2-40B4-BE49-F238E27FC236}">
+                <a16:creationId xmlns:a16="http://schemas.microsoft.com/office/drawing/2014/main" id="{F4DF087C-92F9-43BF-A9D4-7A1114076BBE}"/>
+              </a:ext>
+            </a:extLst>
+          </p:cNvPr>
+          <p:cNvSpPr txBox="1"/>
+          <p:nvPr/>
+        </p:nvSpPr>
+        <p:spPr>
+          <a:xfrm>
+            <a:off x="207392" y="6315959"/>
+            <a:ext cx="3262432" cy="307777"/>
+          </a:xfrm>
+          <a:prstGeom prst="rect">
+            <a:avLst/>
+          </a:prstGeom>
+          <a:noFill/>
+        </p:spPr>
+        <p:txBody>
+          <a:bodyPr wrap="none" rtlCol="0">
+            <a:spAutoFit/>
+          </a:bodyPr>
+          <a:lstStyle/>
+          <a:p>
+            <a:r>
+              <a:rPr lang="es-VE" b="1" dirty="0">
+                <a:latin typeface="Raleway" panose="020B0604020202020204" charset="0"/>
+              </a:rPr>
+              <a:t>Fuente</a:t>
+            </a:r>
+            <a:r>
+              <a:rPr lang="es-VE" dirty="0">
+                <a:latin typeface="Raleway" panose="020B0604020202020204" charset="0"/>
+              </a:rPr>
+              <a:t>: http://online-behavior.com/</a:t>
+            </a:r>
+            <a:endParaRPr lang="en-US" dirty="0">
+              <a:latin typeface="Raleway" panose="020B0604020202020204" charset="0"/>
+            </a:endParaRPr>
+          </a:p>
+        </p:txBody>
+      </p:sp>
     </p:spTree>
     <p:extLst>
       <p:ext uri="{BB962C8B-B14F-4D97-AF65-F5344CB8AC3E}">
@@ -13239,6 +13423,52 @@
               <a:t>Gráfico de Áreas</a:t>
             </a:r>
             <a:endParaRPr lang="en-US" b="1" dirty="0">
+              <a:latin typeface="Raleway" panose="020B0604020202020204" charset="0"/>
+            </a:endParaRPr>
+          </a:p>
+        </p:txBody>
+      </p:sp>
+      <p:sp>
+        <p:nvSpPr>
+          <p:cNvPr id="7" name="TextBox 6">
+            <a:extLst>
+              <a:ext uri="{FF2B5EF4-FFF2-40B4-BE49-F238E27FC236}">
+                <a16:creationId xmlns:a16="http://schemas.microsoft.com/office/drawing/2014/main" id="{2761A133-5D97-4652-82E7-2B0260C846D0}"/>
+              </a:ext>
+            </a:extLst>
+          </p:cNvPr>
+          <p:cNvSpPr txBox="1"/>
+          <p:nvPr/>
+        </p:nvSpPr>
+        <p:spPr>
+          <a:xfrm>
+            <a:off x="315799" y="6315959"/>
+            <a:ext cx="3262432" cy="307777"/>
+          </a:xfrm>
+          <a:prstGeom prst="rect">
+            <a:avLst/>
+          </a:prstGeom>
+          <a:noFill/>
+        </p:spPr>
+        <p:txBody>
+          <a:bodyPr wrap="none" rtlCol="0">
+            <a:spAutoFit/>
+          </a:bodyPr>
+          <a:lstStyle/>
+          <a:p>
+            <a:r>
+              <a:rPr lang="es-VE" b="1" dirty="0">
+                <a:latin typeface="Raleway" panose="020B0604020202020204" charset="0"/>
+              </a:rPr>
+              <a:t>Fuente</a:t>
+            </a:r>
+            <a:r>
+              <a:rPr lang="es-VE" dirty="0">
+                <a:latin typeface="Raleway" panose="020B0604020202020204" charset="0"/>
+              </a:rPr>
+              <a:t>: http://online-behavior.com/</a:t>
+            </a:r>
+            <a:endParaRPr lang="en-US" dirty="0">
               <a:latin typeface="Raleway" panose="020B0604020202020204" charset="0"/>
             </a:endParaRPr>
           </a:p>

</xml_diff>